<commit_message>
jelentkezés design ppt kész #6 #16 #17 #18
</commit_message>
<xml_diff>
--- a/Ppt azaz PowerPoint prezi prezentáció/A Lilaköd-Projekt.pptx
+++ b/Ppt azaz PowerPoint prezi prezentáció/A Lilaköd-Projekt.pptx
@@ -127,7 +127,7 @@
 
 <file path=ppt/commentAuthors.xml><?xml version="1.0" encoding="utf-8"?>
 <p:cmAuthorLst xmlns:a="http://schemas.openxmlformats.org/drawingml/2006/main" xmlns:r="http://schemas.openxmlformats.org/officeDocument/2006/relationships" xmlns:p="http://schemas.openxmlformats.org/presentationml/2006/main">
-  <p:cmAuthor id="3" name="Author" initials="A" lastIdx="0" clrIdx="2"/>
+  <p:cmAuthor id="4" name="Szerző" initials="S" lastIdx="0" clrIdx="3"/>
 </p:cmAuthorLst>
 </file>
 
@@ -219,7 +219,7 @@
               <a:rPr lang="zh-CN" altLang="en-US" smtClean="0">
                 <a:cs typeface="Barlow Condensed" panose="00000506000000000000" charset="0"/>
               </a:rPr>
-              <a:t>2023/5/2</a:t>
+              <a:t>2023/5/3</a:t>
             </a:fld>
             <a:endParaRPr lang="zh-CN" altLang="en-US">
               <a:cs typeface="Barlow Condensed" panose="00000506000000000000" charset="0"/>
@@ -402,7 +402,7 @@
           <a:p>
             <a:fld id="{598217C4-209F-426B-A8D4-2A4EF8D569F3}" type="datetimeFigureOut">
               <a:rPr lang="zh-CN" altLang="en-US" smtClean="0"/>
-              <a:t>2023/5/2</a:t>
+              <a:t>2023/5/3</a:t>
             </a:fld>
             <a:endParaRPr lang="zh-CN" altLang="en-US"/>
           </a:p>
@@ -2432,7 +2432,7 @@
           <a:p>
             <a:fld id="{82590366-ABA8-4BF0-B712-90B06D46FB25}" type="datetimeFigureOut">
               <a:rPr lang="zh-CN" altLang="en-US" smtClean="0"/>
-              <a:t>2023/5/2</a:t>
+              <a:t>2023/5/3</a:t>
             </a:fld>
             <a:endParaRPr lang="zh-CN" altLang="en-US"/>
           </a:p>
@@ -3296,116 +3296,31 @@
             </a:p>
           </p:txBody>
         </p:sp>
-        <p:grpSp>
-          <p:nvGrpSpPr>
-            <p:cNvPr id="10" name="Group 35"/>
-            <p:cNvGrpSpPr/>
+        <p:sp>
+          <p:nvSpPr>
+            <p:cNvPr id="12" name="TextBox 37"/>
+            <p:cNvSpPr txBox="1"/>
             <p:nvPr/>
-          </p:nvGrpSpPr>
-          <p:grpSpPr>
+          </p:nvSpPr>
+          <p:spPr>
             <a:xfrm>
-              <a:off x="1238250" y="4267200"/>
-              <a:ext cx="1602740" cy="356235"/>
-              <a:chOff x="4878401" y="4187518"/>
-              <a:chExt cx="2924707" cy="510450"/>
+              <a:off x="1807144" y="4306848"/>
+              <a:ext cx="463588" cy="276999"/>
             </a:xfrm>
-          </p:grpSpPr>
-          <p:sp>
-            <p:nvSpPr>
-              <p:cNvPr id="11" name="Rounded Rectangle 36"/>
-              <p:cNvSpPr/>
-              <p:nvPr/>
-            </p:nvSpPr>
-            <p:spPr>
-              <a:xfrm>
-                <a:off x="4878401" y="4187518"/>
-                <a:ext cx="2924707" cy="510450"/>
-              </a:xfrm>
-              <a:prstGeom prst="roundRect">
-                <a:avLst>
-                  <a:gd name="adj" fmla="val 50000"/>
-                </a:avLst>
-              </a:prstGeom>
-              <a:solidFill>
-                <a:schemeClr val="accent1"/>
-              </a:solidFill>
-              <a:ln>
-                <a:noFill/>
-              </a:ln>
-              <a:effectLst>
-                <a:outerShdw blurRad="63500" algn="ctr" rotWithShape="0">
-                  <a:prstClr val="black">
-                    <a:alpha val="40000"/>
-                  </a:prstClr>
-                </a:outerShdw>
-              </a:effectLst>
-            </p:spPr>
-            <p:style>
-              <a:lnRef idx="2">
-                <a:schemeClr val="accent1">
-                  <a:shade val="50000"/>
-                </a:schemeClr>
-              </a:lnRef>
-              <a:fillRef idx="1">
-                <a:schemeClr val="accent1"/>
-              </a:fillRef>
-              <a:effectRef idx="0">
-                <a:schemeClr val="accent1"/>
-              </a:effectRef>
-              <a:fontRef idx="minor">
-                <a:schemeClr val="lt1"/>
-              </a:fontRef>
-            </p:style>
-            <p:txBody>
-              <a:bodyPr rtlCol="0" anchor="ctr"/>
-              <a:lstStyle/>
-              <a:p>
-                <a:pPr algn="ctr"/>
-                <a:endParaRPr lang="en-US">
-                  <a:latin typeface="Courier New" panose="02070309020205020404" pitchFamily="49" charset="0"/>
-                  <a:ea typeface="Barlow Condensed" panose="00000506000000000000" charset="0"/>
-                  <a:cs typeface="Courier New" panose="02070309020205020404" pitchFamily="49" charset="0"/>
-                  <a:sym typeface="Barlow Condensed" panose="00000506000000000000" charset="0"/>
-                </a:endParaRPr>
-              </a:p>
-            </p:txBody>
-          </p:sp>
-          <p:sp>
-            <p:nvSpPr>
-              <p:cNvPr id="12" name="TextBox 37"/>
-              <p:cNvSpPr txBox="1"/>
-              <p:nvPr/>
-            </p:nvSpPr>
-            <p:spPr>
-              <a:xfrm>
-                <a:off x="5916528" y="4244330"/>
-                <a:ext cx="845963" cy="396913"/>
-              </a:xfrm>
-              <a:prstGeom prst="rect">
-                <a:avLst/>
-              </a:prstGeom>
-              <a:noFill/>
-            </p:spPr>
-            <p:txBody>
-              <a:bodyPr wrap="none" rtlCol="0">
-                <a:spAutoFit/>
-              </a:bodyPr>
-              <a:lstStyle/>
-              <a:p>
-                <a:pPr algn="ctr"/>
-                <a:r>
-                  <a:rPr lang="hu-HU" altLang="zh-CN" sz="1200" dirty="0">
-                    <a:solidFill>
-                      <a:schemeClr val="bg1"/>
-                    </a:solidFill>
-                    <a:latin typeface="Courier New" panose="02070309020205020404" pitchFamily="49" charset="0"/>
-                    <a:ea typeface="Barlow Condensed" panose="00000506000000000000" charset="0"/>
-                    <a:cs typeface="Courier New" panose="02070309020205020404" pitchFamily="49" charset="0"/>
-                    <a:sym typeface="Barlow Condensed" panose="00000506000000000000" charset="0"/>
-                  </a:rPr>
-                  <a:t>asd</a:t>
-                </a:r>
-                <a:endParaRPr lang="en-US" sz="1200" dirty="0">
+            <a:prstGeom prst="rect">
+              <a:avLst/>
+            </a:prstGeom>
+            <a:noFill/>
+          </p:spPr>
+          <p:txBody>
+            <a:bodyPr wrap="none" rtlCol="0">
+              <a:spAutoFit/>
+            </a:bodyPr>
+            <a:lstStyle/>
+            <a:p>
+              <a:pPr algn="ctr"/>
+              <a:r>
+                <a:rPr lang="hu-HU" altLang="zh-CN" sz="1200" dirty="0">
                   <a:solidFill>
                     <a:schemeClr val="bg1"/>
                   </a:solidFill>
@@ -3413,11 +3328,21 @@
                   <a:ea typeface="Barlow Condensed" panose="00000506000000000000" charset="0"/>
                   <a:cs typeface="Courier New" panose="02070309020205020404" pitchFamily="49" charset="0"/>
                   <a:sym typeface="Barlow Condensed" panose="00000506000000000000" charset="0"/>
-                </a:endParaRPr>
-              </a:p>
-            </p:txBody>
-          </p:sp>
-        </p:grpSp>
+                </a:rPr>
+                <a:t>asd</a:t>
+              </a:r>
+              <a:endParaRPr lang="en-US" sz="1200" dirty="0">
+                <a:solidFill>
+                  <a:schemeClr val="bg1"/>
+                </a:solidFill>
+                <a:latin typeface="Courier New" panose="02070309020205020404" pitchFamily="49" charset="0"/>
+                <a:ea typeface="Barlow Condensed" panose="00000506000000000000" charset="0"/>
+                <a:cs typeface="Courier New" panose="02070309020205020404" pitchFamily="49" charset="0"/>
+                <a:sym typeface="Barlow Condensed" panose="00000506000000000000" charset="0"/>
+              </a:endParaRPr>
+            </a:p>
+          </p:txBody>
+        </p:sp>
         <p:sp>
           <p:nvSpPr>
             <p:cNvPr id="16" name="Rounded Rectangle 4"/>
@@ -3530,116 +3455,31 @@
             </a:p>
           </p:txBody>
         </p:sp>
-        <p:grpSp>
-          <p:nvGrpSpPr>
-            <p:cNvPr id="20" name="Group 38"/>
-            <p:cNvGrpSpPr/>
+        <p:sp>
+          <p:nvSpPr>
+            <p:cNvPr id="22" name="TextBox 40"/>
+            <p:cNvSpPr txBox="1"/>
             <p:nvPr/>
-          </p:nvGrpSpPr>
-          <p:grpSpPr>
+          </p:nvSpPr>
+          <p:spPr>
             <a:xfrm>
-              <a:off x="3943350" y="4267200"/>
-              <a:ext cx="1602740" cy="356235"/>
-              <a:chOff x="4878401" y="4187518"/>
-              <a:chExt cx="2924707" cy="510450"/>
+              <a:off x="4512243" y="4306848"/>
+              <a:ext cx="463588" cy="276999"/>
             </a:xfrm>
-          </p:grpSpPr>
-          <p:sp>
-            <p:nvSpPr>
-              <p:cNvPr id="21" name="Rounded Rectangle 39"/>
-              <p:cNvSpPr/>
-              <p:nvPr/>
-            </p:nvSpPr>
-            <p:spPr>
-              <a:xfrm>
-                <a:off x="4878401" y="4187518"/>
-                <a:ext cx="2924707" cy="510450"/>
-              </a:xfrm>
-              <a:prstGeom prst="roundRect">
-                <a:avLst>
-                  <a:gd name="adj" fmla="val 50000"/>
-                </a:avLst>
-              </a:prstGeom>
-              <a:solidFill>
-                <a:schemeClr val="accent2"/>
-              </a:solidFill>
-              <a:ln>
-                <a:noFill/>
-              </a:ln>
-              <a:effectLst>
-                <a:outerShdw blurRad="63500" algn="ctr" rotWithShape="0">
-                  <a:prstClr val="black">
-                    <a:alpha val="40000"/>
-                  </a:prstClr>
-                </a:outerShdw>
-              </a:effectLst>
-            </p:spPr>
-            <p:style>
-              <a:lnRef idx="2">
-                <a:schemeClr val="accent1">
-                  <a:shade val="50000"/>
-                </a:schemeClr>
-              </a:lnRef>
-              <a:fillRef idx="1">
-                <a:schemeClr val="accent1"/>
-              </a:fillRef>
-              <a:effectRef idx="0">
-                <a:schemeClr val="accent1"/>
-              </a:effectRef>
-              <a:fontRef idx="minor">
-                <a:schemeClr val="lt1"/>
-              </a:fontRef>
-            </p:style>
-            <p:txBody>
-              <a:bodyPr rtlCol="0" anchor="ctr"/>
-              <a:lstStyle/>
-              <a:p>
-                <a:pPr algn="ctr"/>
-                <a:endParaRPr lang="en-US">
-                  <a:latin typeface="Courier New" panose="02070309020205020404" pitchFamily="49" charset="0"/>
-                  <a:ea typeface="Barlow Condensed" panose="00000506000000000000" charset="0"/>
-                  <a:cs typeface="Courier New" panose="02070309020205020404" pitchFamily="49" charset="0"/>
-                  <a:sym typeface="Barlow Condensed" panose="00000506000000000000" charset="0"/>
-                </a:endParaRPr>
-              </a:p>
-            </p:txBody>
-          </p:sp>
-          <p:sp>
-            <p:nvSpPr>
-              <p:cNvPr id="22" name="TextBox 40"/>
-              <p:cNvSpPr txBox="1"/>
-              <p:nvPr/>
-            </p:nvSpPr>
-            <p:spPr>
-              <a:xfrm>
-                <a:off x="5916527" y="4244330"/>
-                <a:ext cx="845963" cy="396913"/>
-              </a:xfrm>
-              <a:prstGeom prst="rect">
-                <a:avLst/>
-              </a:prstGeom>
-              <a:noFill/>
-            </p:spPr>
-            <p:txBody>
-              <a:bodyPr wrap="none" rtlCol="0">
-                <a:spAutoFit/>
-              </a:bodyPr>
-              <a:lstStyle/>
-              <a:p>
-                <a:pPr algn="ctr"/>
-                <a:r>
-                  <a:rPr lang="hu-HU" altLang="zh-CN" sz="1200" dirty="0">
-                    <a:solidFill>
-                      <a:schemeClr val="bg1"/>
-                    </a:solidFill>
-                    <a:latin typeface="Courier New" panose="02070309020205020404" pitchFamily="49" charset="0"/>
-                    <a:ea typeface="Barlow Condensed" panose="00000506000000000000" charset="0"/>
-                    <a:cs typeface="Courier New" panose="02070309020205020404" pitchFamily="49" charset="0"/>
-                    <a:sym typeface="Barlow Condensed" panose="00000506000000000000" charset="0"/>
-                  </a:rPr>
-                  <a:t>asd</a:t>
-                </a:r>
-                <a:endParaRPr lang="en-US" altLang="zh-CN" sz="1200" dirty="0">
+            <a:prstGeom prst="rect">
+              <a:avLst/>
+            </a:prstGeom>
+            <a:noFill/>
+          </p:spPr>
+          <p:txBody>
+            <a:bodyPr wrap="none" rtlCol="0">
+              <a:spAutoFit/>
+            </a:bodyPr>
+            <a:lstStyle/>
+            <a:p>
+              <a:pPr algn="ctr"/>
+              <a:r>
+                <a:rPr lang="hu-HU" altLang="zh-CN" sz="1200" dirty="0">
                   <a:solidFill>
                     <a:schemeClr val="bg1"/>
                   </a:solidFill>
@@ -3647,11 +3487,21 @@
                   <a:ea typeface="Barlow Condensed" panose="00000506000000000000" charset="0"/>
                   <a:cs typeface="Courier New" panose="02070309020205020404" pitchFamily="49" charset="0"/>
                   <a:sym typeface="Barlow Condensed" panose="00000506000000000000" charset="0"/>
-                </a:endParaRPr>
-              </a:p>
-            </p:txBody>
-          </p:sp>
-        </p:grpSp>
+                </a:rPr>
+                <a:t>asd</a:t>
+              </a:r>
+              <a:endParaRPr lang="en-US" altLang="zh-CN" sz="1200" dirty="0">
+                <a:solidFill>
+                  <a:schemeClr val="bg1"/>
+                </a:solidFill>
+                <a:latin typeface="Courier New" panose="02070309020205020404" pitchFamily="49" charset="0"/>
+                <a:ea typeface="Barlow Condensed" panose="00000506000000000000" charset="0"/>
+                <a:cs typeface="Courier New" panose="02070309020205020404" pitchFamily="49" charset="0"/>
+                <a:sym typeface="Barlow Condensed" panose="00000506000000000000" charset="0"/>
+              </a:endParaRPr>
+            </a:p>
+          </p:txBody>
+        </p:sp>
         <p:sp>
           <p:nvSpPr>
             <p:cNvPr id="26" name="Rounded Rectangle 32"/>
@@ -3764,116 +3614,31 @@
             </a:p>
           </p:txBody>
         </p:sp>
-        <p:grpSp>
-          <p:nvGrpSpPr>
-            <p:cNvPr id="30" name="Group 41"/>
-            <p:cNvGrpSpPr/>
+        <p:sp>
+          <p:nvSpPr>
+            <p:cNvPr id="32" name="TextBox 43"/>
+            <p:cNvSpPr txBox="1"/>
             <p:nvPr/>
-          </p:nvGrpSpPr>
-          <p:grpSpPr>
+          </p:nvSpPr>
+          <p:spPr>
             <a:xfrm>
-              <a:off x="6630670" y="4267200"/>
-              <a:ext cx="1602740" cy="356235"/>
-              <a:chOff x="4878401" y="4187518"/>
-              <a:chExt cx="2924707" cy="510450"/>
+              <a:off x="7199563" y="4306848"/>
+              <a:ext cx="463588" cy="276999"/>
             </a:xfrm>
-          </p:grpSpPr>
-          <p:sp>
-            <p:nvSpPr>
-              <p:cNvPr id="31" name="Rounded Rectangle 42"/>
-              <p:cNvSpPr/>
-              <p:nvPr/>
-            </p:nvSpPr>
-            <p:spPr>
-              <a:xfrm>
-                <a:off x="4878401" y="4187518"/>
-                <a:ext cx="2924707" cy="510450"/>
-              </a:xfrm>
-              <a:prstGeom prst="roundRect">
-                <a:avLst>
-                  <a:gd name="adj" fmla="val 50000"/>
-                </a:avLst>
-              </a:prstGeom>
-              <a:solidFill>
-                <a:schemeClr val="accent1"/>
-              </a:solidFill>
-              <a:ln>
-                <a:noFill/>
-              </a:ln>
-              <a:effectLst>
-                <a:outerShdw blurRad="63500" algn="ctr" rotWithShape="0">
-                  <a:prstClr val="black">
-                    <a:alpha val="40000"/>
-                  </a:prstClr>
-                </a:outerShdw>
-              </a:effectLst>
-            </p:spPr>
-            <p:style>
-              <a:lnRef idx="2">
-                <a:schemeClr val="accent1">
-                  <a:shade val="50000"/>
-                </a:schemeClr>
-              </a:lnRef>
-              <a:fillRef idx="1">
-                <a:schemeClr val="accent1"/>
-              </a:fillRef>
-              <a:effectRef idx="0">
-                <a:schemeClr val="accent1"/>
-              </a:effectRef>
-              <a:fontRef idx="minor">
-                <a:schemeClr val="lt1"/>
-              </a:fontRef>
-            </p:style>
-            <p:txBody>
-              <a:bodyPr rtlCol="0" anchor="ctr"/>
-              <a:lstStyle/>
-              <a:p>
-                <a:pPr algn="ctr"/>
-                <a:endParaRPr lang="en-US">
-                  <a:latin typeface="Courier New" panose="02070309020205020404" pitchFamily="49" charset="0"/>
-                  <a:ea typeface="Barlow Condensed" panose="00000506000000000000" charset="0"/>
-                  <a:cs typeface="Courier New" panose="02070309020205020404" pitchFamily="49" charset="0"/>
-                  <a:sym typeface="Barlow Condensed" panose="00000506000000000000" charset="0"/>
-                </a:endParaRPr>
-              </a:p>
-            </p:txBody>
-          </p:sp>
-          <p:sp>
-            <p:nvSpPr>
-              <p:cNvPr id="32" name="TextBox 43"/>
-              <p:cNvSpPr txBox="1"/>
-              <p:nvPr/>
-            </p:nvSpPr>
-            <p:spPr>
-              <a:xfrm>
-                <a:off x="5916527" y="4244330"/>
-                <a:ext cx="845963" cy="396913"/>
-              </a:xfrm>
-              <a:prstGeom prst="rect">
-                <a:avLst/>
-              </a:prstGeom>
-              <a:noFill/>
-            </p:spPr>
-            <p:txBody>
-              <a:bodyPr wrap="none" rtlCol="0">
-                <a:spAutoFit/>
-              </a:bodyPr>
-              <a:lstStyle/>
-              <a:p>
-                <a:pPr algn="ctr"/>
-                <a:r>
-                  <a:rPr lang="hu-HU" altLang="zh-CN" sz="1200" dirty="0">
-                    <a:solidFill>
-                      <a:schemeClr val="bg1"/>
-                    </a:solidFill>
-                    <a:latin typeface="Courier New" panose="02070309020205020404" pitchFamily="49" charset="0"/>
-                    <a:ea typeface="Barlow Condensed" panose="00000506000000000000" charset="0"/>
-                    <a:cs typeface="Courier New" panose="02070309020205020404" pitchFamily="49" charset="0"/>
-                    <a:sym typeface="Barlow Condensed" panose="00000506000000000000" charset="0"/>
-                  </a:rPr>
-                  <a:t>asd</a:t>
-                </a:r>
-                <a:endParaRPr lang="en-US" altLang="zh-CN" sz="1200" dirty="0">
+            <a:prstGeom prst="rect">
+              <a:avLst/>
+            </a:prstGeom>
+            <a:noFill/>
+          </p:spPr>
+          <p:txBody>
+            <a:bodyPr wrap="none" rtlCol="0">
+              <a:spAutoFit/>
+            </a:bodyPr>
+            <a:lstStyle/>
+            <a:p>
+              <a:pPr algn="ctr"/>
+              <a:r>
+                <a:rPr lang="hu-HU" altLang="zh-CN" sz="1200" dirty="0">
                   <a:solidFill>
                     <a:schemeClr val="bg1"/>
                   </a:solidFill>
@@ -3881,11 +3646,21 @@
                   <a:ea typeface="Barlow Condensed" panose="00000506000000000000" charset="0"/>
                   <a:cs typeface="Courier New" panose="02070309020205020404" pitchFamily="49" charset="0"/>
                   <a:sym typeface="Barlow Condensed" panose="00000506000000000000" charset="0"/>
-                </a:endParaRPr>
-              </a:p>
-            </p:txBody>
-          </p:sp>
-        </p:grpSp>
+                </a:rPr>
+                <a:t>asd</a:t>
+              </a:r>
+              <a:endParaRPr lang="en-US" altLang="zh-CN" sz="1200" dirty="0">
+                <a:solidFill>
+                  <a:schemeClr val="bg1"/>
+                </a:solidFill>
+                <a:latin typeface="Courier New" panose="02070309020205020404" pitchFamily="49" charset="0"/>
+                <a:ea typeface="Barlow Condensed" panose="00000506000000000000" charset="0"/>
+                <a:cs typeface="Courier New" panose="02070309020205020404" pitchFamily="49" charset="0"/>
+                <a:sym typeface="Barlow Condensed" panose="00000506000000000000" charset="0"/>
+              </a:endParaRPr>
+            </a:p>
+          </p:txBody>
+        </p:sp>
         <p:sp>
           <p:nvSpPr>
             <p:cNvPr id="3" name="文本框 2"/>
@@ -3925,7 +3700,7 @@
                   <a:cs typeface="Courier New" panose="02070309020205020404" pitchFamily="49" charset="0"/>
                   <a:sym typeface="Barlow Condensed" panose="00000506000000000000" charset="0"/>
                 </a:rPr>
-                <a:t>asdasdasd</a:t>
+                <a:t>Titkos gomb</a:t>
               </a:r>
               <a:endParaRPr lang="en-US" altLang="zh-CN" sz="1400" dirty="0">
                 <a:solidFill>
@@ -3950,7 +3725,7 @@
           <p:spPr>
             <a:xfrm>
               <a:off x="3740785" y="2890520"/>
-              <a:ext cx="2045970" cy="372410"/>
+              <a:ext cx="2045970" cy="1277273"/>
             </a:xfrm>
             <a:prstGeom prst="rect">
               <a:avLst/>
@@ -3980,8 +3755,47 @@
                   <a:cs typeface="Courier New" panose="02070309020205020404" pitchFamily="49" charset="0"/>
                   <a:sym typeface="Barlow Condensed" panose="00000506000000000000" charset="0"/>
                 </a:rPr>
-                <a:t>asdasdasd</a:t>
+                <a:t>Munkatársaink oldal</a:t>
               </a:r>
+            </a:p>
+            <a:p>
+              <a:pPr algn="ctr">
+                <a:lnSpc>
+                  <a:spcPct val="140000"/>
+                </a:lnSpc>
+              </a:pPr>
+              <a:r>
+                <a:rPr lang="hu-HU" altLang="zh-CN" sz="1400" dirty="0" err="1">
+                  <a:solidFill>
+                    <a:schemeClr val="bg2">
+                      <a:lumMod val="25000"/>
+                    </a:schemeClr>
+                  </a:solidFill>
+                  <a:latin typeface="Courier New" panose="02070309020205020404" pitchFamily="49" charset="0"/>
+                  <a:ea typeface="Barlow Condensed" panose="00000506000000000000" charset="0"/>
+                  <a:cs typeface="Courier New" panose="02070309020205020404" pitchFamily="49" charset="0"/>
+                  <a:sym typeface="Barlow Condensed" panose="00000506000000000000" charset="0"/>
+                </a:rPr>
+                <a:t>Navbar</a:t>
+              </a:r>
+              <a:endParaRPr lang="hu-HU" altLang="zh-CN" sz="1400" dirty="0">
+                <a:solidFill>
+                  <a:schemeClr val="bg2">
+                    <a:lumMod val="25000"/>
+                  </a:schemeClr>
+                </a:solidFill>
+                <a:latin typeface="Courier New" panose="02070309020205020404" pitchFamily="49" charset="0"/>
+                <a:ea typeface="Barlow Condensed" panose="00000506000000000000" charset="0"/>
+                <a:cs typeface="Courier New" panose="02070309020205020404" pitchFamily="49" charset="0"/>
+                <a:sym typeface="Barlow Condensed" panose="00000506000000000000" charset="0"/>
+              </a:endParaRPr>
+            </a:p>
+            <a:p>
+              <a:pPr algn="ctr">
+                <a:lnSpc>
+                  <a:spcPct val="140000"/>
+                </a:lnSpc>
+              </a:pPr>
               <a:endParaRPr lang="en-US" altLang="zh-CN" sz="1400" dirty="0">
                 <a:solidFill>
                   <a:schemeClr val="bg2">
@@ -4004,8 +3818,8 @@
           </p:nvSpPr>
           <p:spPr>
             <a:xfrm>
-              <a:off x="6477000" y="2890520"/>
-              <a:ext cx="2045970" cy="372410"/>
+              <a:off x="6408372" y="2824767"/>
+              <a:ext cx="2045970" cy="975652"/>
             </a:xfrm>
             <a:prstGeom prst="rect">
               <a:avLst/>
@@ -4035,7 +3849,53 @@
                   <a:cs typeface="Courier New" panose="02070309020205020404" pitchFamily="49" charset="0"/>
                   <a:sym typeface="Barlow Condensed" panose="00000506000000000000" charset="0"/>
                 </a:rPr>
-                <a:t>asdsadasd</a:t>
+                <a:t>Saját oldalainak </a:t>
+              </a:r>
+              <a:r>
+                <a:rPr lang="hu-HU" altLang="zh-CN" sz="1400" dirty="0" err="1">
+                  <a:solidFill>
+                    <a:schemeClr val="bg2">
+                      <a:lumMod val="25000"/>
+                    </a:schemeClr>
+                  </a:solidFill>
+                  <a:latin typeface="Courier New" panose="02070309020205020404" pitchFamily="49" charset="0"/>
+                  <a:ea typeface="Barlow Condensed" panose="00000506000000000000" charset="0"/>
+                  <a:cs typeface="Courier New" panose="02070309020205020404" pitchFamily="49" charset="0"/>
+                  <a:sym typeface="Barlow Condensed" panose="00000506000000000000" charset="0"/>
+                </a:rPr>
+                <a:t>designolása</a:t>
+              </a:r>
+              <a:endParaRPr lang="hu-HU" altLang="zh-CN" sz="1400" dirty="0">
+                <a:solidFill>
+                  <a:schemeClr val="bg2">
+                    <a:lumMod val="25000"/>
+                  </a:schemeClr>
+                </a:solidFill>
+                <a:latin typeface="Courier New" panose="02070309020205020404" pitchFamily="49" charset="0"/>
+                <a:ea typeface="Barlow Condensed" panose="00000506000000000000" charset="0"/>
+                <a:cs typeface="Courier New" panose="02070309020205020404" pitchFamily="49" charset="0"/>
+                <a:sym typeface="Barlow Condensed" panose="00000506000000000000" charset="0"/>
+              </a:endParaRPr>
+            </a:p>
+            <a:p>
+              <a:pPr algn="ctr">
+                <a:lnSpc>
+                  <a:spcPct val="140000"/>
+                </a:lnSpc>
+              </a:pPr>
+              <a:r>
+                <a:rPr lang="hu-HU" altLang="zh-CN" sz="1400" dirty="0" err="1">
+                  <a:solidFill>
+                    <a:schemeClr val="bg2">
+                      <a:lumMod val="25000"/>
+                    </a:schemeClr>
+                  </a:solidFill>
+                  <a:latin typeface="Courier New" panose="02070309020205020404" pitchFamily="49" charset="0"/>
+                  <a:ea typeface="Barlow Condensed" panose="00000506000000000000" charset="0"/>
+                  <a:cs typeface="Courier New" panose="02070309020205020404" pitchFamily="49" charset="0"/>
+                  <a:sym typeface="Barlow Condensed" panose="00000506000000000000" charset="0"/>
+                </a:rPr>
+                <a:t>Navbar</a:t>
               </a:r>
               <a:endParaRPr lang="en-US" altLang="zh-CN" sz="1400" dirty="0">
                 <a:solidFill>
@@ -4102,7 +3962,7 @@
         <p:spPr>
           <a:xfrm>
             <a:off x="1220470" y="5447103"/>
-            <a:ext cx="10257790" cy="388568"/>
+            <a:ext cx="10257790" cy="1034899"/>
           </a:xfrm>
           <a:prstGeom prst="rect">
             <a:avLst/>
@@ -4132,7 +3992,74 @@
                 <a:cs typeface="Courier New" panose="02070309020205020404" pitchFamily="49" charset="0"/>
                 <a:sym typeface="Barlow Condensed" panose="00000506000000000000" charset="0"/>
               </a:rPr>
-              <a:t>asdasdasd</a:t>
+              <a:t>+ </a:t>
+            </a:r>
+            <a:r>
+              <a:rPr lang="hu-HU" altLang="zh-CN" sz="1400" dirty="0" err="1">
+                <a:solidFill>
+                  <a:schemeClr val="bg2">
+                    <a:lumMod val="25000"/>
+                  </a:schemeClr>
+                </a:solidFill>
+                <a:latin typeface="Courier New" panose="02070309020205020404" pitchFamily="49" charset="0"/>
+                <a:ea typeface="Barlow Condensed" panose="00000506000000000000" charset="0"/>
+                <a:cs typeface="Courier New" panose="02070309020205020404" pitchFamily="49" charset="0"/>
+                <a:sym typeface="Barlow Condensed" panose="00000506000000000000" charset="0"/>
+              </a:rPr>
+              <a:t>Readme</a:t>
+            </a:r>
+            <a:endParaRPr lang="hu-HU" altLang="zh-CN" sz="1400" dirty="0">
+              <a:solidFill>
+                <a:schemeClr val="bg2">
+                  <a:lumMod val="25000"/>
+                </a:schemeClr>
+              </a:solidFill>
+              <a:latin typeface="Courier New" panose="02070309020205020404" pitchFamily="49" charset="0"/>
+              <a:ea typeface="Barlow Condensed" panose="00000506000000000000" charset="0"/>
+              <a:cs typeface="Courier New" panose="02070309020205020404" pitchFamily="49" charset="0"/>
+              <a:sym typeface="Barlow Condensed" panose="00000506000000000000" charset="0"/>
+            </a:endParaRPr>
+          </a:p>
+          <a:p>
+            <a:pPr algn="l">
+              <a:lnSpc>
+                <a:spcPct val="150000"/>
+              </a:lnSpc>
+            </a:pPr>
+            <a:r>
+              <a:rPr lang="hu-HU" altLang="zh-CN" sz="1400" dirty="0">
+                <a:solidFill>
+                  <a:schemeClr val="bg2">
+                    <a:lumMod val="25000"/>
+                  </a:schemeClr>
+                </a:solidFill>
+                <a:latin typeface="Courier New" panose="02070309020205020404" pitchFamily="49" charset="0"/>
+                <a:ea typeface="Barlow Condensed" panose="00000506000000000000" charset="0"/>
+                <a:cs typeface="Courier New" panose="02070309020205020404" pitchFamily="49" charset="0"/>
+                <a:sym typeface="Barlow Condensed" panose="00000506000000000000" charset="0"/>
+              </a:rPr>
+              <a:t>+ Sokat segített</a:t>
+            </a:r>
+          </a:p>
+          <a:p>
+            <a:pPr algn="l">
+              <a:lnSpc>
+                <a:spcPct val="150000"/>
+              </a:lnSpc>
+            </a:pPr>
+            <a:r>
+              <a:rPr lang="hu-HU" altLang="zh-CN" sz="1400" dirty="0">
+                <a:solidFill>
+                  <a:schemeClr val="bg2">
+                    <a:lumMod val="25000"/>
+                  </a:schemeClr>
+                </a:solidFill>
+                <a:latin typeface="Courier New" panose="02070309020205020404" pitchFamily="49" charset="0"/>
+                <a:ea typeface="Barlow Condensed" panose="00000506000000000000" charset="0"/>
+                <a:cs typeface="Courier New" panose="02070309020205020404" pitchFamily="49" charset="0"/>
+                <a:sym typeface="Barlow Condensed" panose="00000506000000000000" charset="0"/>
+              </a:rPr>
+              <a:t>+ Képkeresés </a:t>
             </a:r>
             <a:endParaRPr lang="en-US" altLang="zh-CN" sz="1400" dirty="0">
               <a:solidFill>
@@ -4472,6 +4399,60 @@
           </a:prstGeom>
         </p:spPr>
       </p:pic>
+      <p:sp>
+        <p:nvSpPr>
+          <p:cNvPr id="5" name="Téglalap 4">
+            <a:extLst>
+              <a:ext uri="{FF2B5EF4-FFF2-40B4-BE49-F238E27FC236}">
+                <a16:creationId xmlns:a16="http://schemas.microsoft.com/office/drawing/2014/main" id="{A69D0561-28C2-483A-889E-11B30BB505DE}"/>
+              </a:ext>
+            </a:extLst>
+          </p:cNvPr>
+          <p:cNvSpPr/>
+          <p:nvPr/>
+        </p:nvSpPr>
+        <p:spPr>
+          <a:xfrm>
+            <a:off x="1015365" y="855677"/>
+            <a:ext cx="791779" cy="427839"/>
+          </a:xfrm>
+          <a:prstGeom prst="rect">
+            <a:avLst/>
+          </a:prstGeom>
+          <a:solidFill>
+            <a:schemeClr val="bg1"/>
+          </a:solidFill>
+          <a:ln>
+            <a:solidFill>
+              <a:schemeClr val="bg1"/>
+            </a:solidFill>
+          </a:ln>
+        </p:spPr>
+        <p:style>
+          <a:lnRef idx="2">
+            <a:schemeClr val="accent1">
+              <a:shade val="50000"/>
+            </a:schemeClr>
+          </a:lnRef>
+          <a:fillRef idx="1">
+            <a:schemeClr val="accent1"/>
+          </a:fillRef>
+          <a:effectRef idx="0">
+            <a:schemeClr val="accent1"/>
+          </a:effectRef>
+          <a:fontRef idx="minor">
+            <a:schemeClr val="lt1"/>
+          </a:fontRef>
+        </p:style>
+        <p:txBody>
+          <a:bodyPr rtlCol="0" anchor="ctr"/>
+          <a:lstStyle/>
+          <a:p>
+            <a:pPr algn="ctr"/>
+            <a:endParaRPr lang="hu-HU"/>
+          </a:p>
+        </p:txBody>
+      </p:sp>
     </p:spTree>
   </p:cSld>
   <p:clrMapOvr>
@@ -4759,116 +4740,31 @@
             </a:p>
           </p:txBody>
         </p:sp>
-        <p:grpSp>
-          <p:nvGrpSpPr>
-            <p:cNvPr id="10" name="Group 35"/>
-            <p:cNvGrpSpPr/>
+        <p:sp>
+          <p:nvSpPr>
+            <p:cNvPr id="12" name="TextBox 37"/>
+            <p:cNvSpPr txBox="1"/>
             <p:nvPr/>
-          </p:nvGrpSpPr>
-          <p:grpSpPr>
+          </p:nvSpPr>
+          <p:spPr>
             <a:xfrm>
-              <a:off x="1238250" y="4267200"/>
-              <a:ext cx="1602740" cy="356235"/>
-              <a:chOff x="4878401" y="4187518"/>
-              <a:chExt cx="2924707" cy="510450"/>
+              <a:off x="1853631" y="4306848"/>
+              <a:ext cx="370614" cy="276999"/>
             </a:xfrm>
-          </p:grpSpPr>
-          <p:sp>
-            <p:nvSpPr>
-              <p:cNvPr id="11" name="Rounded Rectangle 36"/>
-              <p:cNvSpPr/>
-              <p:nvPr/>
-            </p:nvSpPr>
-            <p:spPr>
-              <a:xfrm>
-                <a:off x="4878401" y="4187518"/>
-                <a:ext cx="2924707" cy="510450"/>
-              </a:xfrm>
-              <a:prstGeom prst="roundRect">
-                <a:avLst>
-                  <a:gd name="adj" fmla="val 50000"/>
-                </a:avLst>
-              </a:prstGeom>
-              <a:solidFill>
-                <a:schemeClr val="accent1"/>
-              </a:solidFill>
-              <a:ln>
-                <a:noFill/>
-              </a:ln>
-              <a:effectLst>
-                <a:outerShdw blurRad="63500" algn="ctr" rotWithShape="0">
-                  <a:prstClr val="black">
-                    <a:alpha val="40000"/>
-                  </a:prstClr>
-                </a:outerShdw>
-              </a:effectLst>
-            </p:spPr>
-            <p:style>
-              <a:lnRef idx="2">
-                <a:schemeClr val="accent1">
-                  <a:shade val="50000"/>
-                </a:schemeClr>
-              </a:lnRef>
-              <a:fillRef idx="1">
-                <a:schemeClr val="accent1"/>
-              </a:fillRef>
-              <a:effectRef idx="0">
-                <a:schemeClr val="accent1"/>
-              </a:effectRef>
-              <a:fontRef idx="minor">
-                <a:schemeClr val="lt1"/>
-              </a:fontRef>
-            </p:style>
-            <p:txBody>
-              <a:bodyPr rtlCol="0" anchor="ctr"/>
-              <a:lstStyle/>
-              <a:p>
-                <a:pPr algn="ctr"/>
-                <a:endParaRPr lang="en-US">
-                  <a:latin typeface="Courier New" panose="02070309020205020404" pitchFamily="49" charset="0"/>
-                  <a:ea typeface="Barlow Condensed" panose="00000506000000000000" charset="0"/>
-                  <a:cs typeface="Courier New" panose="02070309020205020404" pitchFamily="49" charset="0"/>
-                  <a:sym typeface="Barlow Condensed" panose="00000506000000000000" charset="0"/>
-                </a:endParaRPr>
-              </a:p>
-            </p:txBody>
-          </p:sp>
-          <p:sp>
-            <p:nvSpPr>
-              <p:cNvPr id="12" name="TextBox 37"/>
-              <p:cNvSpPr txBox="1"/>
-              <p:nvPr/>
-            </p:nvSpPr>
-            <p:spPr>
-              <a:xfrm>
-                <a:off x="5916528" y="4244330"/>
-                <a:ext cx="845963" cy="396913"/>
-              </a:xfrm>
-              <a:prstGeom prst="rect">
-                <a:avLst/>
-              </a:prstGeom>
-              <a:noFill/>
-            </p:spPr>
-            <p:txBody>
-              <a:bodyPr wrap="none" rtlCol="0">
-                <a:spAutoFit/>
-              </a:bodyPr>
-              <a:lstStyle/>
-              <a:p>
-                <a:pPr algn="ctr"/>
-                <a:r>
-                  <a:rPr lang="hu-HU" altLang="zh-CN" sz="1200" dirty="0">
-                    <a:solidFill>
-                      <a:schemeClr val="bg1"/>
-                    </a:solidFill>
-                    <a:latin typeface="Courier New" panose="02070309020205020404" pitchFamily="49" charset="0"/>
-                    <a:ea typeface="Barlow Condensed" panose="00000506000000000000" charset="0"/>
-                    <a:cs typeface="Courier New" panose="02070309020205020404" pitchFamily="49" charset="0"/>
-                    <a:sym typeface="Barlow Condensed" panose="00000506000000000000" charset="0"/>
-                  </a:rPr>
-                  <a:t>asd</a:t>
-                </a:r>
-                <a:endParaRPr lang="en-US" sz="1200" dirty="0">
+            <a:prstGeom prst="rect">
+              <a:avLst/>
+            </a:prstGeom>
+            <a:noFill/>
+          </p:spPr>
+          <p:txBody>
+            <a:bodyPr wrap="none" rtlCol="0">
+              <a:spAutoFit/>
+            </a:bodyPr>
+            <a:lstStyle/>
+            <a:p>
+              <a:pPr algn="ctr"/>
+              <a:r>
+                <a:rPr lang="hu-HU" altLang="zh-CN" sz="1200" dirty="0">
                   <a:solidFill>
                     <a:schemeClr val="bg1"/>
                   </a:solidFill>
@@ -4876,11 +4772,21 @@
                   <a:ea typeface="Barlow Condensed" panose="00000506000000000000" charset="0"/>
                   <a:cs typeface="Courier New" panose="02070309020205020404" pitchFamily="49" charset="0"/>
                   <a:sym typeface="Barlow Condensed" panose="00000506000000000000" charset="0"/>
-                </a:endParaRPr>
-              </a:p>
-            </p:txBody>
-          </p:sp>
-        </p:grpSp>
+                </a:rPr>
+                <a:t>ad</a:t>
+              </a:r>
+              <a:endParaRPr lang="en-US" sz="1200" dirty="0">
+                <a:solidFill>
+                  <a:schemeClr val="bg1"/>
+                </a:solidFill>
+                <a:latin typeface="Courier New" panose="02070309020205020404" pitchFamily="49" charset="0"/>
+                <a:ea typeface="Barlow Condensed" panose="00000506000000000000" charset="0"/>
+                <a:cs typeface="Courier New" panose="02070309020205020404" pitchFamily="49" charset="0"/>
+                <a:sym typeface="Barlow Condensed" panose="00000506000000000000" charset="0"/>
+              </a:endParaRPr>
+            </a:p>
+          </p:txBody>
+        </p:sp>
         <p:sp>
           <p:nvSpPr>
             <p:cNvPr id="16" name="Rounded Rectangle 4"/>
@@ -4993,116 +4899,31 @@
             </a:p>
           </p:txBody>
         </p:sp>
-        <p:grpSp>
-          <p:nvGrpSpPr>
-            <p:cNvPr id="20" name="Group 38"/>
-            <p:cNvGrpSpPr/>
+        <p:sp>
+          <p:nvSpPr>
+            <p:cNvPr id="22" name="TextBox 40"/>
+            <p:cNvSpPr txBox="1"/>
             <p:nvPr/>
-          </p:nvGrpSpPr>
-          <p:grpSpPr>
+          </p:nvSpPr>
+          <p:spPr>
             <a:xfrm>
-              <a:off x="3943350" y="4267200"/>
-              <a:ext cx="1602740" cy="356235"/>
-              <a:chOff x="4878401" y="4187518"/>
-              <a:chExt cx="2924707" cy="510450"/>
+              <a:off x="4512243" y="4306848"/>
+              <a:ext cx="463588" cy="276999"/>
             </a:xfrm>
-          </p:grpSpPr>
-          <p:sp>
-            <p:nvSpPr>
-              <p:cNvPr id="21" name="Rounded Rectangle 39"/>
-              <p:cNvSpPr/>
-              <p:nvPr/>
-            </p:nvSpPr>
-            <p:spPr>
-              <a:xfrm>
-                <a:off x="4878401" y="4187518"/>
-                <a:ext cx="2924707" cy="510450"/>
-              </a:xfrm>
-              <a:prstGeom prst="roundRect">
-                <a:avLst>
-                  <a:gd name="adj" fmla="val 50000"/>
-                </a:avLst>
-              </a:prstGeom>
-              <a:solidFill>
-                <a:schemeClr val="accent2"/>
-              </a:solidFill>
-              <a:ln>
-                <a:noFill/>
-              </a:ln>
-              <a:effectLst>
-                <a:outerShdw blurRad="63500" algn="ctr" rotWithShape="0">
-                  <a:prstClr val="black">
-                    <a:alpha val="40000"/>
-                  </a:prstClr>
-                </a:outerShdw>
-              </a:effectLst>
-            </p:spPr>
-            <p:style>
-              <a:lnRef idx="2">
-                <a:schemeClr val="accent1">
-                  <a:shade val="50000"/>
-                </a:schemeClr>
-              </a:lnRef>
-              <a:fillRef idx="1">
-                <a:schemeClr val="accent1"/>
-              </a:fillRef>
-              <a:effectRef idx="0">
-                <a:schemeClr val="accent1"/>
-              </a:effectRef>
-              <a:fontRef idx="minor">
-                <a:schemeClr val="lt1"/>
-              </a:fontRef>
-            </p:style>
-            <p:txBody>
-              <a:bodyPr rtlCol="0" anchor="ctr"/>
-              <a:lstStyle/>
-              <a:p>
-                <a:pPr algn="ctr"/>
-                <a:endParaRPr lang="en-US">
-                  <a:latin typeface="Courier New" panose="02070309020205020404" pitchFamily="49" charset="0"/>
-                  <a:ea typeface="Barlow Condensed" panose="00000506000000000000" charset="0"/>
-                  <a:cs typeface="Courier New" panose="02070309020205020404" pitchFamily="49" charset="0"/>
-                  <a:sym typeface="Barlow Condensed" panose="00000506000000000000" charset="0"/>
-                </a:endParaRPr>
-              </a:p>
-            </p:txBody>
-          </p:sp>
-          <p:sp>
-            <p:nvSpPr>
-              <p:cNvPr id="22" name="TextBox 40"/>
-              <p:cNvSpPr txBox="1"/>
-              <p:nvPr/>
-            </p:nvSpPr>
-            <p:spPr>
-              <a:xfrm>
-                <a:off x="5916527" y="4244330"/>
-                <a:ext cx="845963" cy="396913"/>
-              </a:xfrm>
-              <a:prstGeom prst="rect">
-                <a:avLst/>
-              </a:prstGeom>
-              <a:noFill/>
-            </p:spPr>
-            <p:txBody>
-              <a:bodyPr wrap="none" rtlCol="0">
-                <a:spAutoFit/>
-              </a:bodyPr>
-              <a:lstStyle/>
-              <a:p>
-                <a:pPr algn="ctr"/>
-                <a:r>
-                  <a:rPr lang="hu-HU" altLang="zh-CN" sz="1200" dirty="0">
-                    <a:solidFill>
-                      <a:schemeClr val="bg1"/>
-                    </a:solidFill>
-                    <a:latin typeface="Courier New" panose="02070309020205020404" pitchFamily="49" charset="0"/>
-                    <a:ea typeface="Barlow Condensed" panose="00000506000000000000" charset="0"/>
-                    <a:cs typeface="Courier New" panose="02070309020205020404" pitchFamily="49" charset="0"/>
-                    <a:sym typeface="Barlow Condensed" panose="00000506000000000000" charset="0"/>
-                  </a:rPr>
-                  <a:t>asd</a:t>
-                </a:r>
-                <a:endParaRPr lang="en-US" altLang="zh-CN" sz="1200" dirty="0">
+            <a:prstGeom prst="rect">
+              <a:avLst/>
+            </a:prstGeom>
+            <a:noFill/>
+          </p:spPr>
+          <p:txBody>
+            <a:bodyPr wrap="none" rtlCol="0">
+              <a:spAutoFit/>
+            </a:bodyPr>
+            <a:lstStyle/>
+            <a:p>
+              <a:pPr algn="ctr"/>
+              <a:r>
+                <a:rPr lang="hu-HU" altLang="zh-CN" sz="1200" dirty="0">
                   <a:solidFill>
                     <a:schemeClr val="bg1"/>
                   </a:solidFill>
@@ -5110,11 +4931,21 @@
                   <a:ea typeface="Barlow Condensed" panose="00000506000000000000" charset="0"/>
                   <a:cs typeface="Courier New" panose="02070309020205020404" pitchFamily="49" charset="0"/>
                   <a:sym typeface="Barlow Condensed" panose="00000506000000000000" charset="0"/>
-                </a:endParaRPr>
-              </a:p>
-            </p:txBody>
-          </p:sp>
-        </p:grpSp>
+                </a:rPr>
+                <a:t>asd</a:t>
+              </a:r>
+              <a:endParaRPr lang="en-US" altLang="zh-CN" sz="1200" dirty="0">
+                <a:solidFill>
+                  <a:schemeClr val="bg1"/>
+                </a:solidFill>
+                <a:latin typeface="Courier New" panose="02070309020205020404" pitchFamily="49" charset="0"/>
+                <a:ea typeface="Barlow Condensed" panose="00000506000000000000" charset="0"/>
+                <a:cs typeface="Courier New" panose="02070309020205020404" pitchFamily="49" charset="0"/>
+                <a:sym typeface="Barlow Condensed" panose="00000506000000000000" charset="0"/>
+              </a:endParaRPr>
+            </a:p>
+          </p:txBody>
+        </p:sp>
         <p:sp>
           <p:nvSpPr>
             <p:cNvPr id="26" name="Rounded Rectangle 32"/>
@@ -5227,116 +5058,31 @@
             </a:p>
           </p:txBody>
         </p:sp>
-        <p:grpSp>
-          <p:nvGrpSpPr>
-            <p:cNvPr id="30" name="Group 41"/>
-            <p:cNvGrpSpPr/>
+        <p:sp>
+          <p:nvSpPr>
+            <p:cNvPr id="32" name="TextBox 43"/>
+            <p:cNvSpPr txBox="1"/>
             <p:nvPr/>
-          </p:nvGrpSpPr>
-          <p:grpSpPr>
+          </p:nvSpPr>
+          <p:spPr>
             <a:xfrm>
-              <a:off x="6630670" y="4267200"/>
-              <a:ext cx="1602740" cy="356235"/>
-              <a:chOff x="4878401" y="4187518"/>
-              <a:chExt cx="2924707" cy="510450"/>
+              <a:off x="7199563" y="4306848"/>
+              <a:ext cx="463588" cy="276999"/>
             </a:xfrm>
-          </p:grpSpPr>
-          <p:sp>
-            <p:nvSpPr>
-              <p:cNvPr id="31" name="Rounded Rectangle 42"/>
-              <p:cNvSpPr/>
-              <p:nvPr/>
-            </p:nvSpPr>
-            <p:spPr>
-              <a:xfrm>
-                <a:off x="4878401" y="4187518"/>
-                <a:ext cx="2924707" cy="510450"/>
-              </a:xfrm>
-              <a:prstGeom prst="roundRect">
-                <a:avLst>
-                  <a:gd name="adj" fmla="val 50000"/>
-                </a:avLst>
-              </a:prstGeom>
-              <a:solidFill>
-                <a:schemeClr val="accent1"/>
-              </a:solidFill>
-              <a:ln>
-                <a:noFill/>
-              </a:ln>
-              <a:effectLst>
-                <a:outerShdw blurRad="63500" algn="ctr" rotWithShape="0">
-                  <a:prstClr val="black">
-                    <a:alpha val="40000"/>
-                  </a:prstClr>
-                </a:outerShdw>
-              </a:effectLst>
-            </p:spPr>
-            <p:style>
-              <a:lnRef idx="2">
-                <a:schemeClr val="accent1">
-                  <a:shade val="50000"/>
-                </a:schemeClr>
-              </a:lnRef>
-              <a:fillRef idx="1">
-                <a:schemeClr val="accent1"/>
-              </a:fillRef>
-              <a:effectRef idx="0">
-                <a:schemeClr val="accent1"/>
-              </a:effectRef>
-              <a:fontRef idx="minor">
-                <a:schemeClr val="lt1"/>
-              </a:fontRef>
-            </p:style>
-            <p:txBody>
-              <a:bodyPr rtlCol="0" anchor="ctr"/>
-              <a:lstStyle/>
-              <a:p>
-                <a:pPr algn="ctr"/>
-                <a:endParaRPr lang="en-US">
-                  <a:latin typeface="Courier New" panose="02070309020205020404" pitchFamily="49" charset="0"/>
-                  <a:ea typeface="Barlow Condensed" panose="00000506000000000000" charset="0"/>
-                  <a:cs typeface="Courier New" panose="02070309020205020404" pitchFamily="49" charset="0"/>
-                  <a:sym typeface="Barlow Condensed" panose="00000506000000000000" charset="0"/>
-                </a:endParaRPr>
-              </a:p>
-            </p:txBody>
-          </p:sp>
-          <p:sp>
-            <p:nvSpPr>
-              <p:cNvPr id="32" name="TextBox 43"/>
-              <p:cNvSpPr txBox="1"/>
-              <p:nvPr/>
-            </p:nvSpPr>
-            <p:spPr>
-              <a:xfrm>
-                <a:off x="5916527" y="4244330"/>
-                <a:ext cx="845963" cy="396913"/>
-              </a:xfrm>
-              <a:prstGeom prst="rect">
-                <a:avLst/>
-              </a:prstGeom>
-              <a:noFill/>
-            </p:spPr>
-            <p:txBody>
-              <a:bodyPr wrap="none" rtlCol="0">
-                <a:spAutoFit/>
-              </a:bodyPr>
-              <a:lstStyle/>
-              <a:p>
-                <a:pPr algn="ctr"/>
-                <a:r>
-                  <a:rPr lang="hu-HU" altLang="zh-CN" sz="1200" dirty="0">
-                    <a:solidFill>
-                      <a:schemeClr val="bg1"/>
-                    </a:solidFill>
-                    <a:latin typeface="Courier New" panose="02070309020205020404" pitchFamily="49" charset="0"/>
-                    <a:ea typeface="Barlow Condensed" panose="00000506000000000000" charset="0"/>
-                    <a:cs typeface="Courier New" panose="02070309020205020404" pitchFamily="49" charset="0"/>
-                    <a:sym typeface="Barlow Condensed" panose="00000506000000000000" charset="0"/>
-                  </a:rPr>
-                  <a:t>asd</a:t>
-                </a:r>
-                <a:endParaRPr lang="en-US" altLang="zh-CN" sz="1200" dirty="0">
+            <a:prstGeom prst="rect">
+              <a:avLst/>
+            </a:prstGeom>
+            <a:noFill/>
+          </p:spPr>
+          <p:txBody>
+            <a:bodyPr wrap="none" rtlCol="0">
+              <a:spAutoFit/>
+            </a:bodyPr>
+            <a:lstStyle/>
+            <a:p>
+              <a:pPr algn="ctr"/>
+              <a:r>
+                <a:rPr lang="hu-HU" altLang="zh-CN" sz="1200" dirty="0">
                   <a:solidFill>
                     <a:schemeClr val="bg1"/>
                   </a:solidFill>
@@ -5344,11 +5090,21 @@
                   <a:ea typeface="Barlow Condensed" panose="00000506000000000000" charset="0"/>
                   <a:cs typeface="Courier New" panose="02070309020205020404" pitchFamily="49" charset="0"/>
                   <a:sym typeface="Barlow Condensed" panose="00000506000000000000" charset="0"/>
-                </a:endParaRPr>
-              </a:p>
-            </p:txBody>
-          </p:sp>
-        </p:grpSp>
+                </a:rPr>
+                <a:t>asd</a:t>
+              </a:r>
+              <a:endParaRPr lang="en-US" altLang="zh-CN" sz="1200" dirty="0">
+                <a:solidFill>
+                  <a:schemeClr val="bg1"/>
+                </a:solidFill>
+                <a:latin typeface="Courier New" panose="02070309020205020404" pitchFamily="49" charset="0"/>
+                <a:ea typeface="Barlow Condensed" panose="00000506000000000000" charset="0"/>
+                <a:cs typeface="Courier New" panose="02070309020205020404" pitchFamily="49" charset="0"/>
+                <a:sym typeface="Barlow Condensed" panose="00000506000000000000" charset="0"/>
+              </a:endParaRPr>
+            </a:p>
+          </p:txBody>
+        </p:sp>
         <p:sp>
           <p:nvSpPr>
             <p:cNvPr id="42" name="TextBox 46"/>
@@ -5405,7 +5161,7 @@
           <p:spPr>
             <a:xfrm>
               <a:off x="1015365" y="2890520"/>
-              <a:ext cx="2045970" cy="372410"/>
+              <a:ext cx="2045970" cy="674031"/>
             </a:xfrm>
             <a:prstGeom prst="rect">
               <a:avLst/>
@@ -5435,7 +5191,28 @@
                   <a:cs typeface="Courier New" panose="02070309020205020404" pitchFamily="49" charset="0"/>
                   <a:sym typeface="Barlow Condensed" panose="00000506000000000000" charset="0"/>
                 </a:rPr>
-                <a:t>asdasdasd</a:t>
+                <a:t>Jelentkezés JS</a:t>
+              </a:r>
+            </a:p>
+            <a:p>
+              <a:pPr algn="ctr">
+                <a:lnSpc>
+                  <a:spcPct val="140000"/>
+                </a:lnSpc>
+              </a:pPr>
+              <a:r>
+                <a:rPr lang="hu-HU" altLang="zh-CN" sz="1400" dirty="0">
+                  <a:solidFill>
+                    <a:schemeClr val="bg2">
+                      <a:lumMod val="25000"/>
+                    </a:schemeClr>
+                  </a:solidFill>
+                  <a:latin typeface="Courier New" panose="02070309020205020404" pitchFamily="49" charset="0"/>
+                  <a:ea typeface="Barlow Condensed" panose="00000506000000000000" charset="0"/>
+                  <a:cs typeface="Courier New" panose="02070309020205020404" pitchFamily="49" charset="0"/>
+                  <a:sym typeface="Barlow Condensed" panose="00000506000000000000" charset="0"/>
+                </a:rPr>
+                <a:t>Titkos gomb</a:t>
               </a:r>
               <a:endParaRPr lang="en-US" altLang="zh-CN" sz="1400" dirty="0">
                 <a:solidFill>
@@ -5460,7 +5237,7 @@
           <p:spPr>
             <a:xfrm>
               <a:off x="3740785" y="2890520"/>
-              <a:ext cx="2045970" cy="372410"/>
+              <a:ext cx="2045970" cy="1277273"/>
             </a:xfrm>
             <a:prstGeom prst="rect">
               <a:avLst/>
@@ -5490,7 +5267,49 @@
                   <a:cs typeface="Courier New" panose="02070309020205020404" pitchFamily="49" charset="0"/>
                   <a:sym typeface="Barlow Condensed" panose="00000506000000000000" charset="0"/>
                 </a:rPr>
-                <a:t>asdasdasd</a:t>
+                <a:t>Jelentkezés űrlap</a:t>
+              </a:r>
+            </a:p>
+            <a:p>
+              <a:pPr algn="ctr">
+                <a:lnSpc>
+                  <a:spcPct val="140000"/>
+                </a:lnSpc>
+              </a:pPr>
+              <a:r>
+                <a:rPr lang="hu-HU" altLang="zh-CN" sz="1400" dirty="0">
+                  <a:solidFill>
+                    <a:schemeClr val="bg2">
+                      <a:lumMod val="25000"/>
+                    </a:schemeClr>
+                  </a:solidFill>
+                  <a:latin typeface="Courier New" panose="02070309020205020404" pitchFamily="49" charset="0"/>
+                  <a:ea typeface="Barlow Condensed" panose="00000506000000000000" charset="0"/>
+                  <a:cs typeface="Courier New" panose="02070309020205020404" pitchFamily="49" charset="0"/>
+                  <a:sym typeface="Barlow Condensed" panose="00000506000000000000" charset="0"/>
+                </a:rPr>
+                <a:t>Titkos oldal</a:t>
+              </a:r>
+            </a:p>
+            <a:p>
+              <a:pPr algn="ctr">
+                <a:lnSpc>
+                  <a:spcPct val="140000"/>
+                </a:lnSpc>
+              </a:pPr>
+              <a:r>
+                <a:rPr lang="hu-HU" altLang="zh-CN" sz="1400" dirty="0">
+                  <a:solidFill>
+                    <a:schemeClr val="bg2">
+                      <a:lumMod val="25000"/>
+                    </a:schemeClr>
+                  </a:solidFill>
+                  <a:latin typeface="Courier New" panose="02070309020205020404" pitchFamily="49" charset="0"/>
+                  <a:ea typeface="Barlow Condensed" panose="00000506000000000000" charset="0"/>
+                  <a:cs typeface="Courier New" panose="02070309020205020404" pitchFamily="49" charset="0"/>
+                  <a:sym typeface="Barlow Condensed" panose="00000506000000000000" charset="0"/>
+                </a:rPr>
+                <a:t>Titkos oldalon belüli oldal</a:t>
               </a:r>
               <a:endParaRPr lang="en-US" altLang="zh-CN" sz="1400" dirty="0">
                 <a:solidFill>
@@ -5514,8 +5333,8 @@
           </p:nvSpPr>
           <p:spPr>
             <a:xfrm>
-              <a:off x="6477000" y="2890520"/>
-              <a:ext cx="2045970" cy="372410"/>
+              <a:off x="6475730" y="2687732"/>
+              <a:ext cx="2045970" cy="1578894"/>
             </a:xfrm>
             <a:prstGeom prst="rect">
               <a:avLst/>
@@ -5527,6 +5346,24 @@
               <a:spAutoFit/>
             </a:bodyPr>
             <a:lstStyle/>
+            <a:p>
+              <a:pPr algn="ctr">
+                <a:lnSpc>
+                  <a:spcPct val="140000"/>
+                </a:lnSpc>
+              </a:pPr>
+              <a:endParaRPr lang="hu-HU" altLang="zh-CN" sz="1400" dirty="0">
+                <a:solidFill>
+                  <a:schemeClr val="bg2">
+                    <a:lumMod val="25000"/>
+                  </a:schemeClr>
+                </a:solidFill>
+                <a:latin typeface="Courier New" panose="02070309020205020404" pitchFamily="49" charset="0"/>
+                <a:ea typeface="Barlow Condensed" panose="00000506000000000000" charset="0"/>
+                <a:cs typeface="Courier New" panose="02070309020205020404" pitchFamily="49" charset="0"/>
+                <a:sym typeface="Barlow Condensed" panose="00000506000000000000" charset="0"/>
+              </a:endParaRPr>
+            </a:p>
             <a:p>
               <a:pPr algn="ctr">
                 <a:lnSpc>
@@ -5545,9 +5382,23 @@
                   <a:cs typeface="Courier New" panose="02070309020205020404" pitchFamily="49" charset="0"/>
                   <a:sym typeface="Barlow Condensed" panose="00000506000000000000" charset="0"/>
                 </a:rPr>
-                <a:t>asdasdasd</a:t>
+                <a:t>Fenyegető villogó mozgó pörgő animációk, másik </a:t>
               </a:r>
-              <a:endParaRPr lang="en-US" altLang="zh-CN" sz="1400" dirty="0">
+              <a:r>
+                <a:rPr lang="hu-HU" altLang="zh-CN" sz="1400" dirty="0" err="1">
+                  <a:solidFill>
+                    <a:schemeClr val="bg2">
+                      <a:lumMod val="25000"/>
+                    </a:schemeClr>
+                  </a:solidFill>
+                  <a:latin typeface="Courier New" panose="02070309020205020404" pitchFamily="49" charset="0"/>
+                  <a:ea typeface="Barlow Condensed" panose="00000506000000000000" charset="0"/>
+                  <a:cs typeface="Courier New" panose="02070309020205020404" pitchFamily="49" charset="0"/>
+                  <a:sym typeface="Barlow Condensed" panose="00000506000000000000" charset="0"/>
+                </a:rPr>
+                <a:t>navbar</a:t>
+              </a:r>
+              <a:endParaRPr lang="hu-HU" altLang="zh-CN" sz="1400" dirty="0">
                 <a:solidFill>
                   <a:schemeClr val="bg2">
                     <a:lumMod val="25000"/>
@@ -5603,61 +5454,6 @@
           </p:txBody>
         </p:sp>
       </p:grpSp>
-      <p:sp>
-        <p:nvSpPr>
-          <p:cNvPr id="49" name="文本框 48"/>
-          <p:cNvSpPr txBox="1"/>
-          <p:nvPr/>
-        </p:nvSpPr>
-        <p:spPr>
-          <a:xfrm>
-            <a:off x="1220470" y="5447103"/>
-            <a:ext cx="10257790" cy="388568"/>
-          </a:xfrm>
-          <a:prstGeom prst="rect">
-            <a:avLst/>
-          </a:prstGeom>
-          <a:noFill/>
-        </p:spPr>
-        <p:txBody>
-          <a:bodyPr wrap="square" rtlCol="0">
-            <a:spAutoFit/>
-          </a:bodyPr>
-          <a:lstStyle/>
-          <a:p>
-            <a:pPr algn="l">
-              <a:lnSpc>
-                <a:spcPct val="150000"/>
-              </a:lnSpc>
-            </a:pPr>
-            <a:r>
-              <a:rPr lang="hu-HU" altLang="zh-CN" sz="1400" dirty="0">
-                <a:solidFill>
-                  <a:schemeClr val="bg2">
-                    <a:lumMod val="25000"/>
-                  </a:schemeClr>
-                </a:solidFill>
-                <a:latin typeface="Courier New" panose="02070309020205020404" pitchFamily="49" charset="0"/>
-                <a:ea typeface="Barlow Condensed" panose="00000506000000000000" charset="0"/>
-                <a:cs typeface="Courier New" panose="02070309020205020404" pitchFamily="49" charset="0"/>
-                <a:sym typeface="Barlow Condensed" panose="00000506000000000000" charset="0"/>
-              </a:rPr>
-              <a:t>asdasdasd</a:t>
-            </a:r>
-            <a:endParaRPr lang="en-US" altLang="zh-CN" sz="1400" dirty="0">
-              <a:solidFill>
-                <a:schemeClr val="bg2">
-                  <a:lumMod val="25000"/>
-                </a:schemeClr>
-              </a:solidFill>
-              <a:latin typeface="Courier New" panose="02070309020205020404" pitchFamily="49" charset="0"/>
-              <a:ea typeface="Barlow Condensed" panose="00000506000000000000" charset="0"/>
-              <a:cs typeface="Courier New" panose="02070309020205020404" pitchFamily="49" charset="0"/>
-              <a:sym typeface="Barlow Condensed" panose="00000506000000000000" charset="0"/>
-            </a:endParaRPr>
-          </a:p>
-        </p:txBody>
-      </p:sp>
       <p:sp>
         <p:nvSpPr>
           <p:cNvPr id="4" name="Rectangle 3">
@@ -5982,6 +5778,142 @@
           </a:prstGeom>
         </p:spPr>
       </p:pic>
+      <p:sp>
+        <p:nvSpPr>
+          <p:cNvPr id="5" name="Téglalap 4">
+            <a:extLst>
+              <a:ext uri="{FF2B5EF4-FFF2-40B4-BE49-F238E27FC236}">
+                <a16:creationId xmlns:a16="http://schemas.microsoft.com/office/drawing/2014/main" id="{5F5C6CAE-1D40-4FFE-8F12-7A1A14EC1659}"/>
+              </a:ext>
+            </a:extLst>
+          </p:cNvPr>
+          <p:cNvSpPr/>
+          <p:nvPr/>
+        </p:nvSpPr>
+        <p:spPr>
+          <a:xfrm>
+            <a:off x="938819" y="788565"/>
+            <a:ext cx="868325" cy="486562"/>
+          </a:xfrm>
+          <a:prstGeom prst="rect">
+            <a:avLst/>
+          </a:prstGeom>
+          <a:solidFill>
+            <a:schemeClr val="bg1"/>
+          </a:solidFill>
+          <a:ln>
+            <a:solidFill>
+              <a:schemeClr val="bg1"/>
+            </a:solidFill>
+          </a:ln>
+        </p:spPr>
+        <p:style>
+          <a:lnRef idx="2">
+            <a:schemeClr val="accent1">
+              <a:shade val="50000"/>
+            </a:schemeClr>
+          </a:lnRef>
+          <a:fillRef idx="1">
+            <a:schemeClr val="accent1"/>
+          </a:fillRef>
+          <a:effectRef idx="0">
+            <a:schemeClr val="accent1"/>
+          </a:effectRef>
+          <a:fontRef idx="minor">
+            <a:schemeClr val="lt1"/>
+          </a:fontRef>
+        </p:style>
+        <p:txBody>
+          <a:bodyPr rtlCol="0" anchor="ctr"/>
+          <a:lstStyle/>
+          <a:p>
+            <a:pPr algn="ctr"/>
+            <a:endParaRPr lang="hu-HU"/>
+          </a:p>
+        </p:txBody>
+      </p:sp>
+      <p:sp>
+        <p:nvSpPr>
+          <p:cNvPr id="28" name="文本框 48">
+            <a:extLst>
+              <a:ext uri="{FF2B5EF4-FFF2-40B4-BE49-F238E27FC236}">
+                <a16:creationId xmlns:a16="http://schemas.microsoft.com/office/drawing/2014/main" id="{1EEC8748-8722-48EB-BE2F-31EA60FABD24}"/>
+              </a:ext>
+            </a:extLst>
+          </p:cNvPr>
+          <p:cNvSpPr txBox="1"/>
+          <p:nvPr/>
+        </p:nvSpPr>
+        <p:spPr>
+          <a:xfrm>
+            <a:off x="1220470" y="5447103"/>
+            <a:ext cx="10257790" cy="711733"/>
+          </a:xfrm>
+          <a:prstGeom prst="rect">
+            <a:avLst/>
+          </a:prstGeom>
+          <a:noFill/>
+        </p:spPr>
+        <p:txBody>
+          <a:bodyPr wrap="square" rtlCol="0">
+            <a:spAutoFit/>
+          </a:bodyPr>
+          <a:lstStyle/>
+          <a:p>
+            <a:pPr algn="l">
+              <a:lnSpc>
+                <a:spcPct val="150000"/>
+              </a:lnSpc>
+            </a:pPr>
+            <a:r>
+              <a:rPr lang="hu-HU" altLang="zh-CN" sz="1400" dirty="0">
+                <a:solidFill>
+                  <a:schemeClr val="bg2">
+                    <a:lumMod val="25000"/>
+                  </a:schemeClr>
+                </a:solidFill>
+                <a:latin typeface="Courier New" panose="02070309020205020404" pitchFamily="49" charset="0"/>
+                <a:ea typeface="Barlow Condensed" panose="00000506000000000000" charset="0"/>
+                <a:cs typeface="Courier New" panose="02070309020205020404" pitchFamily="49" charset="0"/>
+                <a:sym typeface="Barlow Condensed" panose="00000506000000000000" charset="0"/>
+              </a:rPr>
+              <a:t>+ Képkeresés</a:t>
+            </a:r>
+          </a:p>
+          <a:p>
+            <a:pPr algn="l">
+              <a:lnSpc>
+                <a:spcPct val="150000"/>
+              </a:lnSpc>
+            </a:pPr>
+            <a:r>
+              <a:rPr lang="hu-HU" altLang="zh-CN" sz="1400" dirty="0">
+                <a:solidFill>
+                  <a:schemeClr val="bg2">
+                    <a:lumMod val="25000"/>
+                  </a:schemeClr>
+                </a:solidFill>
+                <a:latin typeface="Courier New" panose="02070309020205020404" pitchFamily="49" charset="0"/>
+                <a:ea typeface="Barlow Condensed" panose="00000506000000000000" charset="0"/>
+                <a:cs typeface="Courier New" panose="02070309020205020404" pitchFamily="49" charset="0"/>
+                <a:sym typeface="Barlow Condensed" panose="00000506000000000000" charset="0"/>
+              </a:rPr>
+              <a:t>+ Szöveg gyűjtés azaz generálás</a:t>
+            </a:r>
+            <a:endParaRPr lang="en-US" altLang="zh-CN" sz="1400" dirty="0">
+              <a:solidFill>
+                <a:schemeClr val="bg2">
+                  <a:lumMod val="25000"/>
+                </a:schemeClr>
+              </a:solidFill>
+              <a:latin typeface="Courier New" panose="02070309020205020404" pitchFamily="49" charset="0"/>
+              <a:ea typeface="Barlow Condensed" panose="00000506000000000000" charset="0"/>
+              <a:cs typeface="Courier New" panose="02070309020205020404" pitchFamily="49" charset="0"/>
+              <a:sym typeface="Barlow Condensed" panose="00000506000000000000" charset="0"/>
+            </a:endParaRPr>
+          </a:p>
+        </p:txBody>
+      </p:sp>
     </p:spTree>
     <p:extLst>
       <p:ext uri="{BB962C8B-B14F-4D97-AF65-F5344CB8AC3E}">
@@ -6274,116 +6206,31 @@
             </a:p>
           </p:txBody>
         </p:sp>
-        <p:grpSp>
-          <p:nvGrpSpPr>
-            <p:cNvPr id="10" name="Group 35"/>
-            <p:cNvGrpSpPr/>
+        <p:sp>
+          <p:nvSpPr>
+            <p:cNvPr id="12" name="TextBox 37"/>
+            <p:cNvSpPr txBox="1"/>
             <p:nvPr/>
-          </p:nvGrpSpPr>
-          <p:grpSpPr>
+          </p:nvSpPr>
+          <p:spPr>
             <a:xfrm>
-              <a:off x="1238250" y="4267200"/>
-              <a:ext cx="1602740" cy="356235"/>
-              <a:chOff x="4878401" y="4187518"/>
-              <a:chExt cx="2924707" cy="510450"/>
+              <a:off x="1807144" y="4306848"/>
+              <a:ext cx="463588" cy="276999"/>
             </a:xfrm>
-          </p:grpSpPr>
-          <p:sp>
-            <p:nvSpPr>
-              <p:cNvPr id="11" name="Rounded Rectangle 36"/>
-              <p:cNvSpPr/>
-              <p:nvPr/>
-            </p:nvSpPr>
-            <p:spPr>
-              <a:xfrm>
-                <a:off x="4878401" y="4187518"/>
-                <a:ext cx="2924707" cy="510450"/>
-              </a:xfrm>
-              <a:prstGeom prst="roundRect">
-                <a:avLst>
-                  <a:gd name="adj" fmla="val 50000"/>
-                </a:avLst>
-              </a:prstGeom>
-              <a:solidFill>
-                <a:schemeClr val="accent1"/>
-              </a:solidFill>
-              <a:ln>
-                <a:noFill/>
-              </a:ln>
-              <a:effectLst>
-                <a:outerShdw blurRad="63500" algn="ctr" rotWithShape="0">
-                  <a:prstClr val="black">
-                    <a:alpha val="40000"/>
-                  </a:prstClr>
-                </a:outerShdw>
-              </a:effectLst>
-            </p:spPr>
-            <p:style>
-              <a:lnRef idx="2">
-                <a:schemeClr val="accent1">
-                  <a:shade val="50000"/>
-                </a:schemeClr>
-              </a:lnRef>
-              <a:fillRef idx="1">
-                <a:schemeClr val="accent1"/>
-              </a:fillRef>
-              <a:effectRef idx="0">
-                <a:schemeClr val="accent1"/>
-              </a:effectRef>
-              <a:fontRef idx="minor">
-                <a:schemeClr val="lt1"/>
-              </a:fontRef>
-            </p:style>
-            <p:txBody>
-              <a:bodyPr rtlCol="0" anchor="ctr"/>
-              <a:lstStyle/>
-              <a:p>
-                <a:pPr algn="ctr"/>
-                <a:endParaRPr lang="en-US">
-                  <a:latin typeface="Courier New" panose="02070309020205020404" pitchFamily="49" charset="0"/>
-                  <a:ea typeface="Barlow Condensed" panose="00000506000000000000" charset="0"/>
-                  <a:cs typeface="Courier New" panose="02070309020205020404" pitchFamily="49" charset="0"/>
-                  <a:sym typeface="Barlow Condensed" panose="00000506000000000000" charset="0"/>
-                </a:endParaRPr>
-              </a:p>
-            </p:txBody>
-          </p:sp>
-          <p:sp>
-            <p:nvSpPr>
-              <p:cNvPr id="12" name="TextBox 37"/>
-              <p:cNvSpPr txBox="1"/>
-              <p:nvPr/>
-            </p:nvSpPr>
-            <p:spPr>
-              <a:xfrm>
-                <a:off x="5916528" y="4244330"/>
-                <a:ext cx="845963" cy="396913"/>
-              </a:xfrm>
-              <a:prstGeom prst="rect">
-                <a:avLst/>
-              </a:prstGeom>
-              <a:noFill/>
-            </p:spPr>
-            <p:txBody>
-              <a:bodyPr wrap="none" rtlCol="0">
-                <a:spAutoFit/>
-              </a:bodyPr>
-              <a:lstStyle/>
-              <a:p>
-                <a:pPr algn="ctr"/>
-                <a:r>
-                  <a:rPr lang="hu-HU" altLang="zh-CN" sz="1200" dirty="0">
-                    <a:solidFill>
-                      <a:schemeClr val="bg1"/>
-                    </a:solidFill>
-                    <a:latin typeface="Courier New" panose="02070309020205020404" pitchFamily="49" charset="0"/>
-                    <a:ea typeface="Barlow Condensed" panose="00000506000000000000" charset="0"/>
-                    <a:cs typeface="Courier New" panose="02070309020205020404" pitchFamily="49" charset="0"/>
-                    <a:sym typeface="Barlow Condensed" panose="00000506000000000000" charset="0"/>
-                  </a:rPr>
-                  <a:t>asd</a:t>
-                </a:r>
-                <a:endParaRPr lang="en-US" sz="1200" dirty="0">
+            <a:prstGeom prst="rect">
+              <a:avLst/>
+            </a:prstGeom>
+            <a:noFill/>
+          </p:spPr>
+          <p:txBody>
+            <a:bodyPr wrap="none" rtlCol="0">
+              <a:spAutoFit/>
+            </a:bodyPr>
+            <a:lstStyle/>
+            <a:p>
+              <a:pPr algn="ctr"/>
+              <a:r>
+                <a:rPr lang="hu-HU" altLang="zh-CN" sz="1200" dirty="0">
                   <a:solidFill>
                     <a:schemeClr val="bg1"/>
                   </a:solidFill>
@@ -6391,11 +6238,21 @@
                   <a:ea typeface="Barlow Condensed" panose="00000506000000000000" charset="0"/>
                   <a:cs typeface="Courier New" panose="02070309020205020404" pitchFamily="49" charset="0"/>
                   <a:sym typeface="Barlow Condensed" panose="00000506000000000000" charset="0"/>
-                </a:endParaRPr>
-              </a:p>
-            </p:txBody>
-          </p:sp>
-        </p:grpSp>
+                </a:rPr>
+                <a:t>asd</a:t>
+              </a:r>
+              <a:endParaRPr lang="en-US" sz="1200" dirty="0">
+                <a:solidFill>
+                  <a:schemeClr val="bg1"/>
+                </a:solidFill>
+                <a:latin typeface="Courier New" panose="02070309020205020404" pitchFamily="49" charset="0"/>
+                <a:ea typeface="Barlow Condensed" panose="00000506000000000000" charset="0"/>
+                <a:cs typeface="Courier New" panose="02070309020205020404" pitchFamily="49" charset="0"/>
+                <a:sym typeface="Barlow Condensed" panose="00000506000000000000" charset="0"/>
+              </a:endParaRPr>
+            </a:p>
+          </p:txBody>
+        </p:sp>
         <p:sp>
           <p:nvSpPr>
             <p:cNvPr id="16" name="Rounded Rectangle 4"/>
@@ -6508,116 +6365,31 @@
             </a:p>
           </p:txBody>
         </p:sp>
-        <p:grpSp>
-          <p:nvGrpSpPr>
-            <p:cNvPr id="20" name="Group 38"/>
-            <p:cNvGrpSpPr/>
+        <p:sp>
+          <p:nvSpPr>
+            <p:cNvPr id="22" name="TextBox 40"/>
+            <p:cNvSpPr txBox="1"/>
             <p:nvPr/>
-          </p:nvGrpSpPr>
-          <p:grpSpPr>
+          </p:nvSpPr>
+          <p:spPr>
             <a:xfrm>
-              <a:off x="3943350" y="4267200"/>
-              <a:ext cx="1602740" cy="356235"/>
-              <a:chOff x="4878401" y="4187518"/>
-              <a:chExt cx="2924707" cy="510450"/>
+              <a:off x="4512243" y="4306848"/>
+              <a:ext cx="463588" cy="276999"/>
             </a:xfrm>
-          </p:grpSpPr>
-          <p:sp>
-            <p:nvSpPr>
-              <p:cNvPr id="21" name="Rounded Rectangle 39"/>
-              <p:cNvSpPr/>
-              <p:nvPr/>
-            </p:nvSpPr>
-            <p:spPr>
-              <a:xfrm>
-                <a:off x="4878401" y="4187518"/>
-                <a:ext cx="2924707" cy="510450"/>
-              </a:xfrm>
-              <a:prstGeom prst="roundRect">
-                <a:avLst>
-                  <a:gd name="adj" fmla="val 50000"/>
-                </a:avLst>
-              </a:prstGeom>
-              <a:solidFill>
-                <a:schemeClr val="accent2"/>
-              </a:solidFill>
-              <a:ln>
-                <a:noFill/>
-              </a:ln>
-              <a:effectLst>
-                <a:outerShdw blurRad="63500" algn="ctr" rotWithShape="0">
-                  <a:prstClr val="black">
-                    <a:alpha val="40000"/>
-                  </a:prstClr>
-                </a:outerShdw>
-              </a:effectLst>
-            </p:spPr>
-            <p:style>
-              <a:lnRef idx="2">
-                <a:schemeClr val="accent1">
-                  <a:shade val="50000"/>
-                </a:schemeClr>
-              </a:lnRef>
-              <a:fillRef idx="1">
-                <a:schemeClr val="accent1"/>
-              </a:fillRef>
-              <a:effectRef idx="0">
-                <a:schemeClr val="accent1"/>
-              </a:effectRef>
-              <a:fontRef idx="minor">
-                <a:schemeClr val="lt1"/>
-              </a:fontRef>
-            </p:style>
-            <p:txBody>
-              <a:bodyPr rtlCol="0" anchor="ctr"/>
-              <a:lstStyle/>
-              <a:p>
-                <a:pPr algn="ctr"/>
-                <a:endParaRPr lang="en-US">
-                  <a:latin typeface="Courier New" panose="02070309020205020404" pitchFamily="49" charset="0"/>
-                  <a:ea typeface="Barlow Condensed" panose="00000506000000000000" charset="0"/>
-                  <a:cs typeface="Courier New" panose="02070309020205020404" pitchFamily="49" charset="0"/>
-                  <a:sym typeface="Barlow Condensed" panose="00000506000000000000" charset="0"/>
-                </a:endParaRPr>
-              </a:p>
-            </p:txBody>
-          </p:sp>
-          <p:sp>
-            <p:nvSpPr>
-              <p:cNvPr id="22" name="TextBox 40"/>
-              <p:cNvSpPr txBox="1"/>
-              <p:nvPr/>
-            </p:nvSpPr>
-            <p:spPr>
-              <a:xfrm>
-                <a:off x="5916527" y="4244330"/>
-                <a:ext cx="845963" cy="396913"/>
-              </a:xfrm>
-              <a:prstGeom prst="rect">
-                <a:avLst/>
-              </a:prstGeom>
-              <a:noFill/>
-            </p:spPr>
-            <p:txBody>
-              <a:bodyPr wrap="none" rtlCol="0">
-                <a:spAutoFit/>
-              </a:bodyPr>
-              <a:lstStyle/>
-              <a:p>
-                <a:pPr algn="ctr"/>
-                <a:r>
-                  <a:rPr lang="hu-HU" altLang="zh-CN" sz="1200" dirty="0">
-                    <a:solidFill>
-                      <a:schemeClr val="bg1"/>
-                    </a:solidFill>
-                    <a:latin typeface="Courier New" panose="02070309020205020404" pitchFamily="49" charset="0"/>
-                    <a:ea typeface="Barlow Condensed" panose="00000506000000000000" charset="0"/>
-                    <a:cs typeface="Courier New" panose="02070309020205020404" pitchFamily="49" charset="0"/>
-                    <a:sym typeface="Barlow Condensed" panose="00000506000000000000" charset="0"/>
-                  </a:rPr>
-                  <a:t>asd</a:t>
-                </a:r>
-                <a:endParaRPr lang="en-US" altLang="zh-CN" sz="1200" dirty="0">
+            <a:prstGeom prst="rect">
+              <a:avLst/>
+            </a:prstGeom>
+            <a:noFill/>
+          </p:spPr>
+          <p:txBody>
+            <a:bodyPr wrap="none" rtlCol="0">
+              <a:spAutoFit/>
+            </a:bodyPr>
+            <a:lstStyle/>
+            <a:p>
+              <a:pPr algn="ctr"/>
+              <a:r>
+                <a:rPr lang="hu-HU" altLang="zh-CN" sz="1200" dirty="0">
                   <a:solidFill>
                     <a:schemeClr val="bg1"/>
                   </a:solidFill>
@@ -6625,11 +6397,21 @@
                   <a:ea typeface="Barlow Condensed" panose="00000506000000000000" charset="0"/>
                   <a:cs typeface="Courier New" panose="02070309020205020404" pitchFamily="49" charset="0"/>
                   <a:sym typeface="Barlow Condensed" panose="00000506000000000000" charset="0"/>
-                </a:endParaRPr>
-              </a:p>
-            </p:txBody>
-          </p:sp>
-        </p:grpSp>
+                </a:rPr>
+                <a:t>asd</a:t>
+              </a:r>
+              <a:endParaRPr lang="en-US" altLang="zh-CN" sz="1200" dirty="0">
+                <a:solidFill>
+                  <a:schemeClr val="bg1"/>
+                </a:solidFill>
+                <a:latin typeface="Courier New" panose="02070309020205020404" pitchFamily="49" charset="0"/>
+                <a:ea typeface="Barlow Condensed" panose="00000506000000000000" charset="0"/>
+                <a:cs typeface="Courier New" panose="02070309020205020404" pitchFamily="49" charset="0"/>
+                <a:sym typeface="Barlow Condensed" panose="00000506000000000000" charset="0"/>
+              </a:endParaRPr>
+            </a:p>
+          </p:txBody>
+        </p:sp>
         <p:sp>
           <p:nvSpPr>
             <p:cNvPr id="26" name="Rounded Rectangle 32"/>
@@ -6742,116 +6524,31 @@
             </a:p>
           </p:txBody>
         </p:sp>
-        <p:grpSp>
-          <p:nvGrpSpPr>
-            <p:cNvPr id="30" name="Group 41"/>
-            <p:cNvGrpSpPr/>
+        <p:sp>
+          <p:nvSpPr>
+            <p:cNvPr id="32" name="TextBox 43"/>
+            <p:cNvSpPr txBox="1"/>
             <p:nvPr/>
-          </p:nvGrpSpPr>
-          <p:grpSpPr>
+          </p:nvSpPr>
+          <p:spPr>
             <a:xfrm>
-              <a:off x="6630670" y="4267200"/>
-              <a:ext cx="1602740" cy="356235"/>
-              <a:chOff x="4878401" y="4187518"/>
-              <a:chExt cx="2924707" cy="510450"/>
+              <a:off x="7199563" y="4306848"/>
+              <a:ext cx="463588" cy="276999"/>
             </a:xfrm>
-          </p:grpSpPr>
-          <p:sp>
-            <p:nvSpPr>
-              <p:cNvPr id="31" name="Rounded Rectangle 42"/>
-              <p:cNvSpPr/>
-              <p:nvPr/>
-            </p:nvSpPr>
-            <p:spPr>
-              <a:xfrm>
-                <a:off x="4878401" y="4187518"/>
-                <a:ext cx="2924707" cy="510450"/>
-              </a:xfrm>
-              <a:prstGeom prst="roundRect">
-                <a:avLst>
-                  <a:gd name="adj" fmla="val 50000"/>
-                </a:avLst>
-              </a:prstGeom>
-              <a:solidFill>
-                <a:schemeClr val="accent1"/>
-              </a:solidFill>
-              <a:ln>
-                <a:noFill/>
-              </a:ln>
-              <a:effectLst>
-                <a:outerShdw blurRad="63500" algn="ctr" rotWithShape="0">
-                  <a:prstClr val="black">
-                    <a:alpha val="40000"/>
-                  </a:prstClr>
-                </a:outerShdw>
-              </a:effectLst>
-            </p:spPr>
-            <p:style>
-              <a:lnRef idx="2">
-                <a:schemeClr val="accent1">
-                  <a:shade val="50000"/>
-                </a:schemeClr>
-              </a:lnRef>
-              <a:fillRef idx="1">
-                <a:schemeClr val="accent1"/>
-              </a:fillRef>
-              <a:effectRef idx="0">
-                <a:schemeClr val="accent1"/>
-              </a:effectRef>
-              <a:fontRef idx="minor">
-                <a:schemeClr val="lt1"/>
-              </a:fontRef>
-            </p:style>
-            <p:txBody>
-              <a:bodyPr rtlCol="0" anchor="ctr"/>
-              <a:lstStyle/>
-              <a:p>
-                <a:pPr algn="ctr"/>
-                <a:endParaRPr lang="en-US">
-                  <a:latin typeface="Courier New" panose="02070309020205020404" pitchFamily="49" charset="0"/>
-                  <a:ea typeface="Barlow Condensed" panose="00000506000000000000" charset="0"/>
-                  <a:cs typeface="Courier New" panose="02070309020205020404" pitchFamily="49" charset="0"/>
-                  <a:sym typeface="Barlow Condensed" panose="00000506000000000000" charset="0"/>
-                </a:endParaRPr>
-              </a:p>
-            </p:txBody>
-          </p:sp>
-          <p:sp>
-            <p:nvSpPr>
-              <p:cNvPr id="32" name="TextBox 43"/>
-              <p:cNvSpPr txBox="1"/>
-              <p:nvPr/>
-            </p:nvSpPr>
-            <p:spPr>
-              <a:xfrm>
-                <a:off x="5916527" y="4244330"/>
-                <a:ext cx="845963" cy="396913"/>
-              </a:xfrm>
-              <a:prstGeom prst="rect">
-                <a:avLst/>
-              </a:prstGeom>
-              <a:noFill/>
-            </p:spPr>
-            <p:txBody>
-              <a:bodyPr wrap="none" rtlCol="0">
-                <a:spAutoFit/>
-              </a:bodyPr>
-              <a:lstStyle/>
-              <a:p>
-                <a:pPr algn="ctr"/>
-                <a:r>
-                  <a:rPr lang="hu-HU" altLang="zh-CN" sz="1200" dirty="0">
-                    <a:solidFill>
-                      <a:schemeClr val="bg1"/>
-                    </a:solidFill>
-                    <a:latin typeface="Courier New" panose="02070309020205020404" pitchFamily="49" charset="0"/>
-                    <a:ea typeface="Barlow Condensed" panose="00000506000000000000" charset="0"/>
-                    <a:cs typeface="Courier New" panose="02070309020205020404" pitchFamily="49" charset="0"/>
-                    <a:sym typeface="Barlow Condensed" panose="00000506000000000000" charset="0"/>
-                  </a:rPr>
-                  <a:t>asd</a:t>
-                </a:r>
-                <a:endParaRPr lang="en-US" altLang="zh-CN" sz="1200" dirty="0">
+            <a:prstGeom prst="rect">
+              <a:avLst/>
+            </a:prstGeom>
+            <a:noFill/>
+          </p:spPr>
+          <p:txBody>
+            <a:bodyPr wrap="none" rtlCol="0">
+              <a:spAutoFit/>
+            </a:bodyPr>
+            <a:lstStyle/>
+            <a:p>
+              <a:pPr algn="ctr"/>
+              <a:r>
+                <a:rPr lang="hu-HU" altLang="zh-CN" sz="1200" dirty="0">
                   <a:solidFill>
                     <a:schemeClr val="bg1"/>
                   </a:solidFill>
@@ -6859,11 +6556,21 @@
                   <a:ea typeface="Barlow Condensed" panose="00000506000000000000" charset="0"/>
                   <a:cs typeface="Courier New" panose="02070309020205020404" pitchFamily="49" charset="0"/>
                   <a:sym typeface="Barlow Condensed" panose="00000506000000000000" charset="0"/>
-                </a:endParaRPr>
-              </a:p>
-            </p:txBody>
-          </p:sp>
-        </p:grpSp>
+                </a:rPr>
+                <a:t>asd</a:t>
+              </a:r>
+              <a:endParaRPr lang="en-US" altLang="zh-CN" sz="1200" dirty="0">
+                <a:solidFill>
+                  <a:schemeClr val="bg1"/>
+                </a:solidFill>
+                <a:latin typeface="Courier New" panose="02070309020205020404" pitchFamily="49" charset="0"/>
+                <a:ea typeface="Barlow Condensed" panose="00000506000000000000" charset="0"/>
+                <a:cs typeface="Courier New" panose="02070309020205020404" pitchFamily="49" charset="0"/>
+                <a:sym typeface="Barlow Condensed" panose="00000506000000000000" charset="0"/>
+              </a:endParaRPr>
+            </a:p>
+          </p:txBody>
+        </p:sp>
         <p:sp>
           <p:nvSpPr>
             <p:cNvPr id="42" name="TextBox 46"/>
@@ -6950,7 +6657,7 @@
                   <a:cs typeface="Courier New" panose="02070309020205020404" pitchFamily="49" charset="0"/>
                   <a:sym typeface="Barlow Condensed" panose="00000506000000000000" charset="0"/>
                 </a:rPr>
-                <a:t>asdasdasd</a:t>
+                <a:t>Támogatás JS</a:t>
               </a:r>
               <a:endParaRPr lang="en-US" altLang="zh-CN" sz="1400" dirty="0">
                 <a:solidFill>
@@ -6975,7 +6682,7 @@
           <p:spPr>
             <a:xfrm>
               <a:off x="3740785" y="2890520"/>
-              <a:ext cx="2045970" cy="372410"/>
+              <a:ext cx="2045970" cy="975652"/>
             </a:xfrm>
             <a:prstGeom prst="rect">
               <a:avLst/>
@@ -7005,7 +6712,49 @@
                   <a:cs typeface="Courier New" panose="02070309020205020404" pitchFamily="49" charset="0"/>
                   <a:sym typeface="Barlow Condensed" panose="00000506000000000000" charset="0"/>
                 </a:rPr>
-                <a:t>asdasdasd</a:t>
+                <a:t>Index</a:t>
+              </a:r>
+            </a:p>
+            <a:p>
+              <a:pPr algn="ctr">
+                <a:lnSpc>
+                  <a:spcPct val="140000"/>
+                </a:lnSpc>
+              </a:pPr>
+              <a:r>
+                <a:rPr lang="hu-HU" altLang="zh-CN" sz="1400" dirty="0">
+                  <a:solidFill>
+                    <a:schemeClr val="bg2">
+                      <a:lumMod val="25000"/>
+                    </a:schemeClr>
+                  </a:solidFill>
+                  <a:latin typeface="Courier New" panose="02070309020205020404" pitchFamily="49" charset="0"/>
+                  <a:ea typeface="Barlow Condensed" panose="00000506000000000000" charset="0"/>
+                  <a:cs typeface="Courier New" panose="02070309020205020404" pitchFamily="49" charset="0"/>
+                  <a:sym typeface="Barlow Condensed" panose="00000506000000000000" charset="0"/>
+                </a:rPr>
+                <a:t>Rólunk</a:t>
+              </a:r>
+            </a:p>
+            <a:p>
+              <a:pPr algn="ctr">
+                <a:lnSpc>
+                  <a:spcPct val="140000"/>
+                </a:lnSpc>
+              </a:pPr>
+              <a:r>
+                <a:rPr lang="hu-HU" altLang="zh-CN" sz="1400" dirty="0">
+                  <a:solidFill>
+                    <a:schemeClr val="bg2">
+                      <a:lumMod val="25000"/>
+                    </a:schemeClr>
+                  </a:solidFill>
+                  <a:latin typeface="Courier New" panose="02070309020205020404" pitchFamily="49" charset="0"/>
+                  <a:ea typeface="Barlow Condensed" panose="00000506000000000000" charset="0"/>
+                  <a:cs typeface="Courier New" panose="02070309020205020404" pitchFamily="49" charset="0"/>
+                  <a:sym typeface="Barlow Condensed" panose="00000506000000000000" charset="0"/>
+                </a:rPr>
+                <a:t>Támogatás</a:t>
               </a:r>
               <a:endParaRPr lang="en-US" altLang="zh-CN" sz="1400" dirty="0">
                 <a:solidFill>
@@ -7030,7 +6779,7 @@
           <p:spPr>
             <a:xfrm>
               <a:off x="6477000" y="2890520"/>
-              <a:ext cx="2045970" cy="372410"/>
+              <a:ext cx="2045970" cy="1578894"/>
             </a:xfrm>
             <a:prstGeom prst="rect">
               <a:avLst/>
@@ -7060,7 +6809,70 @@
                   <a:cs typeface="Courier New" panose="02070309020205020404" pitchFamily="49" charset="0"/>
                   <a:sym typeface="Barlow Condensed" panose="00000506000000000000" charset="0"/>
                 </a:rPr>
-                <a:t>asdasdasd</a:t>
+                <a:t>Főcím animáció</a:t>
+              </a:r>
+            </a:p>
+            <a:p>
+              <a:pPr algn="ctr">
+                <a:lnSpc>
+                  <a:spcPct val="140000"/>
+                </a:lnSpc>
+              </a:pPr>
+              <a:r>
+                <a:rPr lang="hu-HU" altLang="zh-CN" sz="1400" dirty="0">
+                  <a:solidFill>
+                    <a:schemeClr val="bg2">
+                      <a:lumMod val="25000"/>
+                    </a:schemeClr>
+                  </a:solidFill>
+                  <a:latin typeface="Courier New" panose="02070309020205020404" pitchFamily="49" charset="0"/>
+                  <a:ea typeface="Barlow Condensed" panose="00000506000000000000" charset="0"/>
+                  <a:cs typeface="Courier New" panose="02070309020205020404" pitchFamily="49" charset="0"/>
+                  <a:sym typeface="Barlow Condensed" panose="00000506000000000000" charset="0"/>
+                </a:rPr>
+                <a:t>Fel le lebegő fényes doboz</a:t>
+              </a:r>
+            </a:p>
+            <a:p>
+              <a:pPr algn="ctr">
+                <a:lnSpc>
+                  <a:spcPct val="140000"/>
+                </a:lnSpc>
+              </a:pPr>
+              <a:r>
+                <a:rPr lang="hu-HU" altLang="zh-CN" sz="1400" dirty="0">
+                  <a:solidFill>
+                    <a:schemeClr val="bg2">
+                      <a:lumMod val="25000"/>
+                    </a:schemeClr>
+                  </a:solidFill>
+                  <a:latin typeface="Courier New" panose="02070309020205020404" pitchFamily="49" charset="0"/>
+                  <a:ea typeface="Barlow Condensed" panose="00000506000000000000" charset="0"/>
+                  <a:cs typeface="Courier New" panose="02070309020205020404" pitchFamily="49" charset="0"/>
+                  <a:sym typeface="Barlow Condensed" panose="00000506000000000000" charset="0"/>
+                </a:rPr>
+                <a:t>Design</a:t>
+              </a:r>
+            </a:p>
+            <a:p>
+              <a:pPr algn="ctr">
+                <a:lnSpc>
+                  <a:spcPct val="140000"/>
+                </a:lnSpc>
+              </a:pPr>
+              <a:r>
+                <a:rPr lang="hu-HU" altLang="zh-CN" sz="1400" dirty="0" err="1">
+                  <a:solidFill>
+                    <a:schemeClr val="bg2">
+                      <a:lumMod val="25000"/>
+                    </a:schemeClr>
+                  </a:solidFill>
+                  <a:latin typeface="Courier New" panose="02070309020205020404" pitchFamily="49" charset="0"/>
+                  <a:ea typeface="Barlow Condensed" panose="00000506000000000000" charset="0"/>
+                  <a:cs typeface="Courier New" panose="02070309020205020404" pitchFamily="49" charset="0"/>
+                  <a:sym typeface="Barlow Condensed" panose="00000506000000000000" charset="0"/>
+                </a:rPr>
+                <a:t>Navbar</a:t>
               </a:r>
               <a:endParaRPr lang="en-US" altLang="zh-CN" sz="1400" dirty="0">
                 <a:solidFill>
@@ -7118,61 +6930,6 @@
           </p:txBody>
         </p:sp>
       </p:grpSp>
-      <p:sp>
-        <p:nvSpPr>
-          <p:cNvPr id="49" name="文本框 48"/>
-          <p:cNvSpPr txBox="1"/>
-          <p:nvPr/>
-        </p:nvSpPr>
-        <p:spPr>
-          <a:xfrm>
-            <a:off x="1220470" y="5447103"/>
-            <a:ext cx="10257790" cy="388568"/>
-          </a:xfrm>
-          <a:prstGeom prst="rect">
-            <a:avLst/>
-          </a:prstGeom>
-          <a:noFill/>
-        </p:spPr>
-        <p:txBody>
-          <a:bodyPr wrap="square" rtlCol="0">
-            <a:spAutoFit/>
-          </a:bodyPr>
-          <a:lstStyle/>
-          <a:p>
-            <a:pPr algn="l">
-              <a:lnSpc>
-                <a:spcPct val="150000"/>
-              </a:lnSpc>
-            </a:pPr>
-            <a:r>
-              <a:rPr lang="hu-HU" altLang="zh-CN" sz="1400" dirty="0">
-                <a:solidFill>
-                  <a:schemeClr val="bg2">
-                    <a:lumMod val="25000"/>
-                  </a:schemeClr>
-                </a:solidFill>
-                <a:latin typeface="Courier New" panose="02070309020205020404" pitchFamily="49" charset="0"/>
-                <a:ea typeface="Barlow Condensed" panose="00000506000000000000" charset="0"/>
-                <a:cs typeface="Courier New" panose="02070309020205020404" pitchFamily="49" charset="0"/>
-                <a:sym typeface="Barlow Condensed" panose="00000506000000000000" charset="0"/>
-              </a:rPr>
-              <a:t>asdasdasd</a:t>
-            </a:r>
-            <a:endParaRPr lang="en-US" altLang="zh-CN" sz="1400" dirty="0">
-              <a:solidFill>
-                <a:schemeClr val="bg2">
-                  <a:lumMod val="25000"/>
-                </a:schemeClr>
-              </a:solidFill>
-              <a:latin typeface="Courier New" panose="02070309020205020404" pitchFamily="49" charset="0"/>
-              <a:ea typeface="Barlow Condensed" panose="00000506000000000000" charset="0"/>
-              <a:cs typeface="Courier New" panose="02070309020205020404" pitchFamily="49" charset="0"/>
-              <a:sym typeface="Barlow Condensed" panose="00000506000000000000" charset="0"/>
-            </a:endParaRPr>
-          </a:p>
-        </p:txBody>
-      </p:sp>
       <p:sp>
         <p:nvSpPr>
           <p:cNvPr id="4" name="Rectangle 3">
@@ -7497,6 +7254,121 @@
           </a:prstGeom>
         </p:spPr>
       </p:pic>
+      <p:sp>
+        <p:nvSpPr>
+          <p:cNvPr id="5" name="Téglalap 4">
+            <a:extLst>
+              <a:ext uri="{FF2B5EF4-FFF2-40B4-BE49-F238E27FC236}">
+                <a16:creationId xmlns:a16="http://schemas.microsoft.com/office/drawing/2014/main" id="{A71A4341-F63A-4157-8B14-B4896E570005}"/>
+              </a:ext>
+            </a:extLst>
+          </p:cNvPr>
+          <p:cNvSpPr/>
+          <p:nvPr/>
+        </p:nvSpPr>
+        <p:spPr>
+          <a:xfrm>
+            <a:off x="938819" y="864066"/>
+            <a:ext cx="883531" cy="453006"/>
+          </a:xfrm>
+          <a:prstGeom prst="rect">
+            <a:avLst/>
+          </a:prstGeom>
+          <a:solidFill>
+            <a:schemeClr val="bg1"/>
+          </a:solidFill>
+          <a:ln>
+            <a:solidFill>
+              <a:schemeClr val="bg1"/>
+            </a:solidFill>
+          </a:ln>
+        </p:spPr>
+        <p:style>
+          <a:lnRef idx="2">
+            <a:schemeClr val="accent1">
+              <a:shade val="50000"/>
+            </a:schemeClr>
+          </a:lnRef>
+          <a:fillRef idx="1">
+            <a:schemeClr val="accent1"/>
+          </a:fillRef>
+          <a:effectRef idx="0">
+            <a:schemeClr val="accent1"/>
+          </a:effectRef>
+          <a:fontRef idx="minor">
+            <a:schemeClr val="lt1"/>
+          </a:fontRef>
+        </p:style>
+        <p:txBody>
+          <a:bodyPr rtlCol="0" anchor="ctr"/>
+          <a:lstStyle/>
+          <a:p>
+            <a:pPr algn="ctr"/>
+            <a:endParaRPr lang="hu-HU"/>
+          </a:p>
+        </p:txBody>
+      </p:sp>
+      <p:sp>
+        <p:nvSpPr>
+          <p:cNvPr id="25" name="文本框 48">
+            <a:extLst>
+              <a:ext uri="{FF2B5EF4-FFF2-40B4-BE49-F238E27FC236}">
+                <a16:creationId xmlns:a16="http://schemas.microsoft.com/office/drawing/2014/main" id="{CF461624-BE3B-4039-A956-1387BBDB1C0D}"/>
+              </a:ext>
+            </a:extLst>
+          </p:cNvPr>
+          <p:cNvSpPr txBox="1"/>
+          <p:nvPr/>
+        </p:nvSpPr>
+        <p:spPr>
+          <a:xfrm>
+            <a:off x="1220470" y="5447103"/>
+            <a:ext cx="10257790" cy="388568"/>
+          </a:xfrm>
+          <a:prstGeom prst="rect">
+            <a:avLst/>
+          </a:prstGeom>
+          <a:noFill/>
+        </p:spPr>
+        <p:txBody>
+          <a:bodyPr wrap="square" rtlCol="0">
+            <a:spAutoFit/>
+          </a:bodyPr>
+          <a:lstStyle/>
+          <a:p>
+            <a:pPr algn="l">
+              <a:lnSpc>
+                <a:spcPct val="150000"/>
+              </a:lnSpc>
+            </a:pPr>
+            <a:r>
+              <a:rPr lang="hu-HU" altLang="zh-CN" sz="1400" dirty="0">
+                <a:solidFill>
+                  <a:schemeClr val="bg2">
+                    <a:lumMod val="25000"/>
+                  </a:schemeClr>
+                </a:solidFill>
+                <a:latin typeface="Courier New" panose="02070309020205020404" pitchFamily="49" charset="0"/>
+                <a:ea typeface="Barlow Condensed" panose="00000506000000000000" charset="0"/>
+                <a:cs typeface="Courier New" panose="02070309020205020404" pitchFamily="49" charset="0"/>
+                <a:sym typeface="Barlow Condensed" panose="00000506000000000000" charset="0"/>
+              </a:rPr>
+              <a:t>+ Képkeresés</a:t>
+            </a:r>
+            <a:endParaRPr lang="en-US" altLang="zh-CN" sz="1400" dirty="0">
+              <a:solidFill>
+                <a:schemeClr val="bg2">
+                  <a:lumMod val="25000"/>
+                </a:schemeClr>
+              </a:solidFill>
+              <a:latin typeface="Courier New" panose="02070309020205020404" pitchFamily="49" charset="0"/>
+              <a:ea typeface="Barlow Condensed" panose="00000506000000000000" charset="0"/>
+              <a:cs typeface="Courier New" panose="02070309020205020404" pitchFamily="49" charset="0"/>
+              <a:sym typeface="Barlow Condensed" panose="00000506000000000000" charset="0"/>
+            </a:endParaRPr>
+          </a:p>
+        </p:txBody>
+      </p:sp>
     </p:spTree>
     <p:extLst>
       <p:ext uri="{BB962C8B-B14F-4D97-AF65-F5344CB8AC3E}">

</xml_diff>